<commit_message>
Now with animations and patter!
</commit_message>
<xml_diff>
--- a/leading technical debt/OwnershipLoop.pptx
+++ b/leading technical debt/OwnershipLoop.pptx
@@ -6,8 +6,8 @@
   </p:sldMasterIdLst>
   <p:sldIdLst>
     <p:sldId id="258" r:id="rId5"/>
-    <p:sldId id="259" r:id="rId6"/>
-    <p:sldId id="260" r:id="rId7"/>
+    <p:sldId id="261" r:id="rId6"/>
+    <p:sldId id="262" r:id="rId7"/>
   </p:sldIdLst>
   <p:sldSz cx="12192000" cy="6858000"/>
   <p:notesSz cx="6858000" cy="9144000"/>
@@ -106,11 +106,12 @@
       </a:defRPr>
     </a:lvl9pPr>
   </p:defaultTextStyle>
+  <p:extLst>
+    <p:ext uri="{EFAFB233-063F-42B5-8137-9DF3F51BA10A}">
+      <p15:sldGuideLst xmlns:p15="http://schemas.microsoft.com/office/powerpoint/2012/main"/>
+    </p:ext>
+  </p:extLst>
 </p:presentation>
-</file>
-
-<file path=ppt/revisionInfo.xml><?xml version="1.0" encoding="utf-8"?>
-<p1510:revInfo xmlns:a="http://schemas.openxmlformats.org/drawingml/2006/main" xmlns:r="http://schemas.openxmlformats.org/officeDocument/2006/relationships" xmlns:p1510="http://schemas.microsoft.com/office/powerpoint/2015/10/main"/>
 </file>
 
 <file path=ppt/slideLayouts/slideLayout1.xml><?xml version="1.0" encoding="utf-8"?>
@@ -260,7 +261,7 @@
           <a:p>
             <a:fld id="{A4C48B93-28E4-4C02-AD16-818F5A1B978A}" type="datetimeFigureOut">
               <a:rPr lang="en-US" smtClean="0"/>
-              <a:t>8/30/2018</a:t>
+              <a:t>4/9/2019</a:t>
             </a:fld>
             <a:endParaRPr lang="en-US"/>
           </a:p>
@@ -458,7 +459,7 @@
           <a:p>
             <a:fld id="{A4C48B93-28E4-4C02-AD16-818F5A1B978A}" type="datetimeFigureOut">
               <a:rPr lang="en-US" smtClean="0"/>
-              <a:t>8/30/2018</a:t>
+              <a:t>4/9/2019</a:t>
             </a:fld>
             <a:endParaRPr lang="en-US"/>
           </a:p>
@@ -666,7 +667,7 @@
           <a:p>
             <a:fld id="{A4C48B93-28E4-4C02-AD16-818F5A1B978A}" type="datetimeFigureOut">
               <a:rPr lang="en-US" smtClean="0"/>
-              <a:t>8/30/2018</a:t>
+              <a:t>4/9/2019</a:t>
             </a:fld>
             <a:endParaRPr lang="en-US"/>
           </a:p>
@@ -864,7 +865,7 @@
           <a:p>
             <a:fld id="{A4C48B93-28E4-4C02-AD16-818F5A1B978A}" type="datetimeFigureOut">
               <a:rPr lang="en-US" smtClean="0"/>
-              <a:t>8/30/2018</a:t>
+              <a:t>4/9/2019</a:t>
             </a:fld>
             <a:endParaRPr lang="en-US"/>
           </a:p>
@@ -1139,7 +1140,7 @@
           <a:p>
             <a:fld id="{A4C48B93-28E4-4C02-AD16-818F5A1B978A}" type="datetimeFigureOut">
               <a:rPr lang="en-US" smtClean="0"/>
-              <a:t>8/30/2018</a:t>
+              <a:t>4/9/2019</a:t>
             </a:fld>
             <a:endParaRPr lang="en-US"/>
           </a:p>
@@ -1404,7 +1405,7 @@
           <a:p>
             <a:fld id="{A4C48B93-28E4-4C02-AD16-818F5A1B978A}" type="datetimeFigureOut">
               <a:rPr lang="en-US" smtClean="0"/>
-              <a:t>8/30/2018</a:t>
+              <a:t>4/9/2019</a:t>
             </a:fld>
             <a:endParaRPr lang="en-US"/>
           </a:p>
@@ -1816,7 +1817,7 @@
           <a:p>
             <a:fld id="{A4C48B93-28E4-4C02-AD16-818F5A1B978A}" type="datetimeFigureOut">
               <a:rPr lang="en-US" smtClean="0"/>
-              <a:t>8/30/2018</a:t>
+              <a:t>4/9/2019</a:t>
             </a:fld>
             <a:endParaRPr lang="en-US"/>
           </a:p>
@@ -1957,7 +1958,7 @@
           <a:p>
             <a:fld id="{A4C48B93-28E4-4C02-AD16-818F5A1B978A}" type="datetimeFigureOut">
               <a:rPr lang="en-US" smtClean="0"/>
-              <a:t>8/30/2018</a:t>
+              <a:t>4/9/2019</a:t>
             </a:fld>
             <a:endParaRPr lang="en-US"/>
           </a:p>
@@ -2070,7 +2071,7 @@
           <a:p>
             <a:fld id="{A4C48B93-28E4-4C02-AD16-818F5A1B978A}" type="datetimeFigureOut">
               <a:rPr lang="en-US" smtClean="0"/>
-              <a:t>8/30/2018</a:t>
+              <a:t>4/9/2019</a:t>
             </a:fld>
             <a:endParaRPr lang="en-US"/>
           </a:p>
@@ -2381,7 +2382,7 @@
           <a:p>
             <a:fld id="{A4C48B93-28E4-4C02-AD16-818F5A1B978A}" type="datetimeFigureOut">
               <a:rPr lang="en-US" smtClean="0"/>
-              <a:t>8/30/2018</a:t>
+              <a:t>4/9/2019</a:t>
             </a:fld>
             <a:endParaRPr lang="en-US"/>
           </a:p>
@@ -2669,7 +2670,7 @@
           <a:p>
             <a:fld id="{A4C48B93-28E4-4C02-AD16-818F5A1B978A}" type="datetimeFigureOut">
               <a:rPr lang="en-US" smtClean="0"/>
-              <a:t>8/30/2018</a:t>
+              <a:t>4/9/2019</a:t>
             </a:fld>
             <a:endParaRPr lang="en-US"/>
           </a:p>
@@ -2910,7 +2911,7 @@
           <a:p>
             <a:fld id="{A4C48B93-28E4-4C02-AD16-818F5A1B978A}" type="datetimeFigureOut">
               <a:rPr lang="en-US" smtClean="0"/>
-              <a:t>8/30/2018</a:t>
+              <a:t>4/9/2019</a:t>
             </a:fld>
             <a:endParaRPr lang="en-US"/>
           </a:p>
@@ -3382,7 +3383,7 @@
                   <a:schemeClr val="tx1"/>
                 </a:solidFill>
               </a:rPr>
-              <a:t>Execution</a:t>
+              <a:t>Execute</a:t>
             </a:r>
           </a:p>
         </p:txBody>
@@ -3401,7 +3402,7 @@
         </p:nvSpPr>
         <p:spPr>
           <a:xfrm>
-            <a:off x="7442859" y="2811110"/>
+            <a:off x="7438112" y="2268222"/>
             <a:ext cx="2054352" cy="731520"/>
           </a:xfrm>
           <a:prstGeom prst="ellipse">
@@ -3456,7 +3457,7 @@
         </p:nvSpPr>
         <p:spPr>
           <a:xfrm>
-            <a:off x="7642328" y="4543288"/>
+            <a:off x="7642328" y="4779931"/>
             <a:ext cx="1645920" cy="731520"/>
           </a:xfrm>
           <a:prstGeom prst="ellipse">
@@ -3511,7 +3512,7 @@
         </p:nvSpPr>
         <p:spPr>
           <a:xfrm>
-            <a:off x="9239805" y="3812673"/>
+            <a:off x="9288248" y="4094726"/>
             <a:ext cx="1645920" cy="731520"/>
           </a:xfrm>
           <a:prstGeom prst="ellipse">
@@ -3571,7 +3572,7 @@
         </p:nvSpPr>
         <p:spPr>
           <a:xfrm>
-            <a:off x="9219020" y="3445579"/>
+            <a:off x="10268691" y="3700377"/>
             <a:ext cx="825867" cy="369332"/>
           </a:xfrm>
           <a:prstGeom prst="rect">
@@ -3654,8 +3655,8 @@
         </p:nvCxnSpPr>
         <p:spPr>
           <a:xfrm flipV="1">
-            <a:off x="9288248" y="4544193"/>
-            <a:ext cx="774517" cy="364855"/>
+            <a:off x="9288248" y="4826246"/>
+            <a:ext cx="822960" cy="319445"/>
           </a:xfrm>
           <a:prstGeom prst="curvedConnector2">
             <a:avLst/>
@@ -3697,8 +3698,8 @@
         </p:nvCxnSpPr>
         <p:spPr>
           <a:xfrm rot="10800000" flipV="1">
-            <a:off x="6824225" y="3176869"/>
-            <a:ext cx="618634" cy="1024985"/>
+            <a:off x="6824226" y="2633981"/>
+            <a:ext cx="613887" cy="1567873"/>
           </a:xfrm>
           <a:prstGeom prst="curvedConnector2">
             <a:avLst/>
@@ -3734,19 +3735,17 @@
           <p:cNvCxnSpPr>
             <a:cxnSpLocks/>
             <a:stCxn id="2" idx="5"/>
-            <a:endCxn id="5" idx="3"/>
+            <a:endCxn id="5" idx="2"/>
           </p:cNvCxnSpPr>
           <p:nvPr/>
         </p:nvCxnSpPr>
         <p:spPr>
           <a:xfrm rot="16200000" flipH="1">
-            <a:off x="7129515" y="4413827"/>
-            <a:ext cx="448562" cy="1059142"/>
-          </a:xfrm>
-          <a:prstGeom prst="curvedConnector3">
-            <a:avLst>
-              <a:gd name="adj1" fmla="val 120486"/>
-            </a:avLst>
+            <a:off x="7019989" y="4523352"/>
+            <a:ext cx="426574" cy="818103"/>
+          </a:xfrm>
+          <a:prstGeom prst="curvedConnector2">
+            <a:avLst/>
           </a:prstGeom>
           <a:ln w="38100">
             <a:tailEnd type="triangle"/>
@@ -3779,17 +3778,19 @@
           <p:cNvCxnSpPr>
             <a:cxnSpLocks/>
             <a:stCxn id="6" idx="0"/>
-            <a:endCxn id="4" idx="6"/>
+            <a:endCxn id="21" idx="4"/>
           </p:cNvCxnSpPr>
           <p:nvPr/>
         </p:nvCxnSpPr>
         <p:spPr>
-          <a:xfrm rot="16200000" flipV="1">
-            <a:off x="9462087" y="3211995"/>
-            <a:ext cx="635803" cy="565554"/>
-          </a:xfrm>
-          <a:prstGeom prst="curvedConnector2">
-            <a:avLst/>
+          <a:xfrm rot="5400000" flipH="1" flipV="1">
+            <a:off x="9914593" y="3898111"/>
+            <a:ext cx="393230" cy="12700"/>
+          </a:xfrm>
+          <a:prstGeom prst="curvedConnector3">
+            <a:avLst>
+              <a:gd name="adj1" fmla="val 50000"/>
+            </a:avLst>
           </a:prstGeom>
           <a:ln w="38100">
             <a:tailEnd type="triangle"/>
@@ -3824,8 +3825,8 @@
         </p:nvSpPr>
         <p:spPr>
           <a:xfrm>
-            <a:off x="5205984" y="2633472"/>
-            <a:ext cx="5864352" cy="3060192"/>
+            <a:off x="5205984" y="2027208"/>
+            <a:ext cx="5864352" cy="3666456"/>
           </a:xfrm>
           <a:prstGeom prst="roundRect">
             <a:avLst/>
@@ -3891,6 +3892,143 @@
             <a:r>
               <a:rPr lang="en-US" dirty="0"/>
               <a:t>What we do today</a:t>
+            </a:r>
+          </a:p>
+        </p:txBody>
+      </p:sp>
+      <p:sp>
+        <p:nvSpPr>
+          <p:cNvPr id="21" name="Oval 20">
+            <a:extLst>
+              <a:ext uri="{FF2B5EF4-FFF2-40B4-BE49-F238E27FC236}">
+                <a16:creationId xmlns:a16="http://schemas.microsoft.com/office/drawing/2014/main" id="{9D6D71A2-9BE7-4CA4-9966-5A1B756D7120}"/>
+              </a:ext>
+            </a:extLst>
+          </p:cNvPr>
+          <p:cNvSpPr/>
+          <p:nvPr/>
+        </p:nvSpPr>
+        <p:spPr>
+          <a:xfrm>
+            <a:off x="9288248" y="2969976"/>
+            <a:ext cx="1645920" cy="731520"/>
+          </a:xfrm>
+          <a:prstGeom prst="ellipse">
+            <a:avLst/>
+          </a:prstGeom>
+          <a:solidFill>
+            <a:schemeClr val="accent2">
+              <a:lumMod val="40000"/>
+              <a:lumOff val="60000"/>
+            </a:schemeClr>
+          </a:solidFill>
+          <a:ln w="28575"/>
+        </p:spPr>
+        <p:style>
+          <a:lnRef idx="2">
+            <a:schemeClr val="accent1">
+              <a:shade val="50000"/>
+            </a:schemeClr>
+          </a:lnRef>
+          <a:fillRef idx="1">
+            <a:schemeClr val="accent1"/>
+          </a:fillRef>
+          <a:effectRef idx="0">
+            <a:schemeClr val="accent1"/>
+          </a:effectRef>
+          <a:fontRef idx="minor">
+            <a:schemeClr val="lt1"/>
+          </a:fontRef>
+        </p:style>
+        <p:txBody>
+          <a:bodyPr rtlCol="0" anchor="ctr"/>
+          <a:lstStyle/>
+          <a:p>
+            <a:pPr algn="ctr"/>
+            <a:r>
+              <a:rPr lang="en-US" dirty="0">
+                <a:solidFill>
+                  <a:schemeClr val="tx1"/>
+                </a:solidFill>
+              </a:rPr>
+              <a:t>Direction</a:t>
+            </a:r>
+          </a:p>
+        </p:txBody>
+      </p:sp>
+      <p:cxnSp>
+        <p:nvCxnSpPr>
+          <p:cNvPr id="22" name="Connector: Curved 21">
+            <a:extLst>
+              <a:ext uri="{FF2B5EF4-FFF2-40B4-BE49-F238E27FC236}">
+                <a16:creationId xmlns:a16="http://schemas.microsoft.com/office/drawing/2014/main" id="{F1B44C3D-E3C8-45AD-9768-257517B3CE17}"/>
+              </a:ext>
+            </a:extLst>
+          </p:cNvPr>
+          <p:cNvCxnSpPr>
+            <a:stCxn id="21" idx="0"/>
+            <a:endCxn id="4" idx="6"/>
+          </p:cNvCxnSpPr>
+          <p:nvPr/>
+        </p:nvCxnSpPr>
+        <p:spPr>
+          <a:xfrm rot="16200000" flipV="1">
+            <a:off x="9633839" y="2492607"/>
+            <a:ext cx="335994" cy="618744"/>
+          </a:xfrm>
+          <a:prstGeom prst="curvedConnector2">
+            <a:avLst/>
+          </a:prstGeom>
+          <a:ln w="38100">
+            <a:tailEnd type="triangle"/>
+          </a:ln>
+        </p:spPr>
+        <p:style>
+          <a:lnRef idx="3">
+            <a:schemeClr val="accent1"/>
+          </a:lnRef>
+          <a:fillRef idx="0">
+            <a:schemeClr val="accent1"/>
+          </a:fillRef>
+          <a:effectRef idx="2">
+            <a:schemeClr val="accent1"/>
+          </a:effectRef>
+          <a:fontRef idx="minor">
+            <a:schemeClr val="tx1"/>
+          </a:fontRef>
+        </p:style>
+      </p:cxnSp>
+      <p:sp>
+        <p:nvSpPr>
+          <p:cNvPr id="29" name="TextBox 28">
+            <a:extLst>
+              <a:ext uri="{FF2B5EF4-FFF2-40B4-BE49-F238E27FC236}">
+                <a16:creationId xmlns:a16="http://schemas.microsoft.com/office/drawing/2014/main" id="{E075943F-1931-4150-8DE2-755A8F37CBC8}"/>
+              </a:ext>
+            </a:extLst>
+          </p:cNvPr>
+          <p:cNvSpPr txBox="1"/>
+          <p:nvPr/>
+        </p:nvSpPr>
+        <p:spPr>
+          <a:xfrm>
+            <a:off x="7642328" y="5705613"/>
+            <a:ext cx="2037289" cy="369332"/>
+          </a:xfrm>
+          <a:prstGeom prst="rect">
+            <a:avLst/>
+          </a:prstGeom>
+          <a:noFill/>
+        </p:spPr>
+        <p:txBody>
+          <a:bodyPr wrap="none" rtlCol="0">
+            <a:spAutoFit/>
+          </a:bodyPr>
+          <a:lstStyle/>
+          <a:p>
+            <a:r>
+              <a:rPr lang="en-US" dirty="0"/>
+              <a:t>Accountability Loop</a:t>
             </a:r>
           </a:p>
         </p:txBody>
@@ -3905,6 +4043,459 @@
   <p:clrMapOvr>
     <a:masterClrMapping/>
   </p:clrMapOvr>
+  <p:timing>
+    <p:tnLst>
+      <p:par>
+        <p:cTn id="1" dur="indefinite" restart="never" nodeType="tmRoot">
+          <p:childTnLst>
+            <p:seq concurrent="1" nextAc="seek">
+              <p:cTn id="2" dur="indefinite" nodeType="mainSeq">
+                <p:childTnLst>
+                  <p:par>
+                    <p:cTn id="3" fill="hold">
+                      <p:stCondLst>
+                        <p:cond delay="indefinite"/>
+                      </p:stCondLst>
+                      <p:childTnLst>
+                        <p:par>
+                          <p:cTn id="4" fill="hold">
+                            <p:stCondLst>
+                              <p:cond delay="0"/>
+                            </p:stCondLst>
+                            <p:childTnLst>
+                              <p:par>
+                                <p:cTn id="5" presetID="1" presetClass="entr" presetSubtype="0" fill="hold" grpId="0" nodeType="clickEffect">
+                                  <p:stCondLst>
+                                    <p:cond delay="0"/>
+                                  </p:stCondLst>
+                                  <p:childTnLst>
+                                    <p:set>
+                                      <p:cBhvr>
+                                        <p:cTn id="6" dur="1" fill="hold">
+                                          <p:stCondLst>
+                                            <p:cond delay="0"/>
+                                          </p:stCondLst>
+                                        </p:cTn>
+                                        <p:tgtEl>
+                                          <p:spTgt spid="4"/>
+                                        </p:tgtEl>
+                                        <p:attrNameLst>
+                                          <p:attrName>style.visibility</p:attrName>
+                                        </p:attrNameLst>
+                                      </p:cBhvr>
+                                      <p:to>
+                                        <p:strVal val="visible"/>
+                                      </p:to>
+                                    </p:set>
+                                  </p:childTnLst>
+                                </p:cTn>
+                              </p:par>
+                              <p:par>
+                                <p:cTn id="7" presetID="1" presetClass="entr" presetSubtype="0" fill="hold" nodeType="withEffect">
+                                  <p:stCondLst>
+                                    <p:cond delay="0"/>
+                                  </p:stCondLst>
+                                  <p:childTnLst>
+                                    <p:set>
+                                      <p:cBhvr>
+                                        <p:cTn id="8" dur="1" fill="hold">
+                                          <p:stCondLst>
+                                            <p:cond delay="0"/>
+                                          </p:stCondLst>
+                                        </p:cTn>
+                                        <p:tgtEl>
+                                          <p:spTgt spid="22"/>
+                                        </p:tgtEl>
+                                        <p:attrNameLst>
+                                          <p:attrName>style.visibility</p:attrName>
+                                        </p:attrNameLst>
+                                      </p:cBhvr>
+                                      <p:to>
+                                        <p:strVal val="visible"/>
+                                      </p:to>
+                                    </p:set>
+                                  </p:childTnLst>
+                                </p:cTn>
+                              </p:par>
+                            </p:childTnLst>
+                          </p:cTn>
+                        </p:par>
+                      </p:childTnLst>
+                    </p:cTn>
+                  </p:par>
+                  <p:par>
+                    <p:cTn id="9" fill="hold">
+                      <p:stCondLst>
+                        <p:cond delay="indefinite"/>
+                      </p:stCondLst>
+                      <p:childTnLst>
+                        <p:par>
+                          <p:cTn id="10" fill="hold">
+                            <p:stCondLst>
+                              <p:cond delay="0"/>
+                            </p:stCondLst>
+                            <p:childTnLst>
+                              <p:par>
+                                <p:cTn id="11" presetID="1" presetClass="entr" presetSubtype="0" fill="hold" grpId="0" nodeType="clickEffect">
+                                  <p:stCondLst>
+                                    <p:cond delay="0"/>
+                                  </p:stCondLst>
+                                  <p:childTnLst>
+                                    <p:set>
+                                      <p:cBhvr>
+                                        <p:cTn id="12" dur="1" fill="hold">
+                                          <p:stCondLst>
+                                            <p:cond delay="0"/>
+                                          </p:stCondLst>
+                                        </p:cTn>
+                                        <p:tgtEl>
+                                          <p:spTgt spid="2"/>
+                                        </p:tgtEl>
+                                        <p:attrNameLst>
+                                          <p:attrName>style.visibility</p:attrName>
+                                        </p:attrNameLst>
+                                      </p:cBhvr>
+                                      <p:to>
+                                        <p:strVal val="visible"/>
+                                      </p:to>
+                                    </p:set>
+                                  </p:childTnLst>
+                                </p:cTn>
+                              </p:par>
+                              <p:par>
+                                <p:cTn id="13" presetID="1" presetClass="entr" presetSubtype="0" fill="hold" nodeType="withEffect">
+                                  <p:stCondLst>
+                                    <p:cond delay="0"/>
+                                  </p:stCondLst>
+                                  <p:childTnLst>
+                                    <p:set>
+                                      <p:cBhvr>
+                                        <p:cTn id="14" dur="1" fill="hold">
+                                          <p:stCondLst>
+                                            <p:cond delay="0"/>
+                                          </p:stCondLst>
+                                        </p:cTn>
+                                        <p:tgtEl>
+                                          <p:spTgt spid="20"/>
+                                        </p:tgtEl>
+                                        <p:attrNameLst>
+                                          <p:attrName>style.visibility</p:attrName>
+                                        </p:attrNameLst>
+                                      </p:cBhvr>
+                                      <p:to>
+                                        <p:strVal val="visible"/>
+                                      </p:to>
+                                    </p:set>
+                                  </p:childTnLst>
+                                </p:cTn>
+                              </p:par>
+                            </p:childTnLst>
+                          </p:cTn>
+                        </p:par>
+                      </p:childTnLst>
+                    </p:cTn>
+                  </p:par>
+                  <p:par>
+                    <p:cTn id="15" fill="hold">
+                      <p:stCondLst>
+                        <p:cond delay="indefinite"/>
+                      </p:stCondLst>
+                      <p:childTnLst>
+                        <p:par>
+                          <p:cTn id="16" fill="hold">
+                            <p:stCondLst>
+                              <p:cond delay="0"/>
+                            </p:stCondLst>
+                            <p:childTnLst>
+                              <p:par>
+                                <p:cTn id="17" presetID="1" presetClass="entr" presetSubtype="0" fill="hold" nodeType="clickEffect">
+                                  <p:stCondLst>
+                                    <p:cond delay="0"/>
+                                  </p:stCondLst>
+                                  <p:childTnLst>
+                                    <p:set>
+                                      <p:cBhvr>
+                                        <p:cTn id="18" dur="1" fill="hold">
+                                          <p:stCondLst>
+                                            <p:cond delay="0"/>
+                                          </p:stCondLst>
+                                        </p:cTn>
+                                        <p:tgtEl>
+                                          <p:spTgt spid="24"/>
+                                        </p:tgtEl>
+                                        <p:attrNameLst>
+                                          <p:attrName>style.visibility</p:attrName>
+                                        </p:attrNameLst>
+                                      </p:cBhvr>
+                                      <p:to>
+                                        <p:strVal val="visible"/>
+                                      </p:to>
+                                    </p:set>
+                                  </p:childTnLst>
+                                </p:cTn>
+                              </p:par>
+                              <p:par>
+                                <p:cTn id="19" presetID="1" presetClass="entr" presetSubtype="0" fill="hold" grpId="0" nodeType="withEffect">
+                                  <p:stCondLst>
+                                    <p:cond delay="0"/>
+                                  </p:stCondLst>
+                                  <p:childTnLst>
+                                    <p:set>
+                                      <p:cBhvr>
+                                        <p:cTn id="20" dur="1" fill="hold">
+                                          <p:stCondLst>
+                                            <p:cond delay="0"/>
+                                          </p:stCondLst>
+                                        </p:cTn>
+                                        <p:tgtEl>
+                                          <p:spTgt spid="5"/>
+                                        </p:tgtEl>
+                                        <p:attrNameLst>
+                                          <p:attrName>style.visibility</p:attrName>
+                                        </p:attrNameLst>
+                                      </p:cBhvr>
+                                      <p:to>
+                                        <p:strVal val="visible"/>
+                                      </p:to>
+                                    </p:set>
+                                  </p:childTnLst>
+                                </p:cTn>
+                              </p:par>
+                            </p:childTnLst>
+                          </p:cTn>
+                        </p:par>
+                      </p:childTnLst>
+                    </p:cTn>
+                  </p:par>
+                  <p:par>
+                    <p:cTn id="21" fill="hold">
+                      <p:stCondLst>
+                        <p:cond delay="indefinite"/>
+                      </p:stCondLst>
+                      <p:childTnLst>
+                        <p:par>
+                          <p:cTn id="22" fill="hold">
+                            <p:stCondLst>
+                              <p:cond delay="0"/>
+                            </p:stCondLst>
+                            <p:childTnLst>
+                              <p:par>
+                                <p:cTn id="23" presetID="1" presetClass="entr" presetSubtype="0" fill="hold" nodeType="clickEffect">
+                                  <p:stCondLst>
+                                    <p:cond delay="0"/>
+                                  </p:stCondLst>
+                                  <p:childTnLst>
+                                    <p:set>
+                                      <p:cBhvr>
+                                        <p:cTn id="24" dur="1" fill="hold">
+                                          <p:stCondLst>
+                                            <p:cond delay="0"/>
+                                          </p:stCondLst>
+                                        </p:cTn>
+                                        <p:tgtEl>
+                                          <p:spTgt spid="19"/>
+                                        </p:tgtEl>
+                                        <p:attrNameLst>
+                                          <p:attrName>style.visibility</p:attrName>
+                                        </p:attrNameLst>
+                                      </p:cBhvr>
+                                      <p:to>
+                                        <p:strVal val="visible"/>
+                                      </p:to>
+                                    </p:set>
+                                  </p:childTnLst>
+                                </p:cTn>
+                              </p:par>
+                              <p:par>
+                                <p:cTn id="25" presetID="1" presetClass="entr" presetSubtype="0" fill="hold" grpId="0" nodeType="withEffect">
+                                  <p:stCondLst>
+                                    <p:cond delay="0"/>
+                                  </p:stCondLst>
+                                  <p:childTnLst>
+                                    <p:set>
+                                      <p:cBhvr>
+                                        <p:cTn id="26" dur="1" fill="hold">
+                                          <p:stCondLst>
+                                            <p:cond delay="0"/>
+                                          </p:stCondLst>
+                                        </p:cTn>
+                                        <p:tgtEl>
+                                          <p:spTgt spid="6"/>
+                                        </p:tgtEl>
+                                        <p:attrNameLst>
+                                          <p:attrName>style.visibility</p:attrName>
+                                        </p:attrNameLst>
+                                      </p:cBhvr>
+                                      <p:to>
+                                        <p:strVal val="visible"/>
+                                      </p:to>
+                                    </p:set>
+                                  </p:childTnLst>
+                                </p:cTn>
+                              </p:par>
+                              <p:par>
+                                <p:cTn id="27" presetID="1" presetClass="entr" presetSubtype="0" fill="hold" nodeType="withEffect">
+                                  <p:stCondLst>
+                                    <p:cond delay="0"/>
+                                  </p:stCondLst>
+                                  <p:childTnLst>
+                                    <p:set>
+                                      <p:cBhvr>
+                                        <p:cTn id="28" dur="1" fill="hold">
+                                          <p:stCondLst>
+                                            <p:cond delay="0"/>
+                                          </p:stCondLst>
+                                        </p:cTn>
+                                        <p:tgtEl>
+                                          <p:spTgt spid="25"/>
+                                        </p:tgtEl>
+                                        <p:attrNameLst>
+                                          <p:attrName>style.visibility</p:attrName>
+                                        </p:attrNameLst>
+                                      </p:cBhvr>
+                                      <p:to>
+                                        <p:strVal val="visible"/>
+                                      </p:to>
+                                    </p:set>
+                                  </p:childTnLst>
+                                </p:cTn>
+                              </p:par>
+                            </p:childTnLst>
+                          </p:cTn>
+                        </p:par>
+                      </p:childTnLst>
+                    </p:cTn>
+                  </p:par>
+                  <p:par>
+                    <p:cTn id="29" fill="hold">
+                      <p:stCondLst>
+                        <p:cond delay="indefinite"/>
+                      </p:stCondLst>
+                      <p:childTnLst>
+                        <p:par>
+                          <p:cTn id="30" fill="hold">
+                            <p:stCondLst>
+                              <p:cond delay="0"/>
+                            </p:stCondLst>
+                            <p:childTnLst>
+                              <p:par>
+                                <p:cTn id="31" presetID="1" presetClass="entr" presetSubtype="0" fill="hold" grpId="0" nodeType="clickEffect">
+                                  <p:stCondLst>
+                                    <p:cond delay="0"/>
+                                  </p:stCondLst>
+                                  <p:childTnLst>
+                                    <p:set>
+                                      <p:cBhvr>
+                                        <p:cTn id="32" dur="1" fill="hold">
+                                          <p:stCondLst>
+                                            <p:cond delay="0"/>
+                                          </p:stCondLst>
+                                        </p:cTn>
+                                        <p:tgtEl>
+                                          <p:spTgt spid="29"/>
+                                        </p:tgtEl>
+                                        <p:attrNameLst>
+                                          <p:attrName>style.visibility</p:attrName>
+                                        </p:attrNameLst>
+                                      </p:cBhvr>
+                                      <p:to>
+                                        <p:strVal val="visible"/>
+                                      </p:to>
+                                    </p:set>
+                                  </p:childTnLst>
+                                </p:cTn>
+                              </p:par>
+                              <p:par>
+                                <p:cTn id="33" presetID="1" presetClass="entr" presetSubtype="0" fill="hold" grpId="0" nodeType="withEffect">
+                                  <p:stCondLst>
+                                    <p:cond delay="0"/>
+                                  </p:stCondLst>
+                                  <p:childTnLst>
+                                    <p:set>
+                                      <p:cBhvr>
+                                        <p:cTn id="34" dur="1" fill="hold">
+                                          <p:stCondLst>
+                                            <p:cond delay="0"/>
+                                          </p:stCondLst>
+                                        </p:cTn>
+                                        <p:tgtEl>
+                                          <p:spTgt spid="75"/>
+                                        </p:tgtEl>
+                                        <p:attrNameLst>
+                                          <p:attrName>style.visibility</p:attrName>
+                                        </p:attrNameLst>
+                                      </p:cBhvr>
+                                      <p:to>
+                                        <p:strVal val="visible"/>
+                                      </p:to>
+                                    </p:set>
+                                  </p:childTnLst>
+                                </p:cTn>
+                              </p:par>
+                              <p:par>
+                                <p:cTn id="35" presetID="1" presetClass="exit" presetSubtype="0" fill="hold" grpId="0" nodeType="withEffect">
+                                  <p:stCondLst>
+                                    <p:cond delay="0"/>
+                                  </p:stCondLst>
+                                  <p:childTnLst>
+                                    <p:set>
+                                      <p:cBhvr>
+                                        <p:cTn id="36" dur="1" fill="hold">
+                                          <p:stCondLst>
+                                            <p:cond delay="0"/>
+                                          </p:stCondLst>
+                                        </p:cTn>
+                                        <p:tgtEl>
+                                          <p:spTgt spid="85"/>
+                                        </p:tgtEl>
+                                        <p:attrNameLst>
+                                          <p:attrName>style.visibility</p:attrName>
+                                        </p:attrNameLst>
+                                      </p:cBhvr>
+                                      <p:to>
+                                        <p:strVal val="hidden"/>
+                                      </p:to>
+                                    </p:set>
+                                  </p:childTnLst>
+                                </p:cTn>
+                              </p:par>
+                            </p:childTnLst>
+                          </p:cTn>
+                        </p:par>
+                      </p:childTnLst>
+                    </p:cTn>
+                  </p:par>
+                </p:childTnLst>
+              </p:cTn>
+              <p:prevCondLst>
+                <p:cond evt="onPrev" delay="0">
+                  <p:tgtEl>
+                    <p:sldTgt/>
+                  </p:tgtEl>
+                </p:cond>
+              </p:prevCondLst>
+              <p:nextCondLst>
+                <p:cond evt="onNext" delay="0">
+                  <p:tgtEl>
+                    <p:sldTgt/>
+                  </p:tgtEl>
+                </p:cond>
+              </p:nextCondLst>
+            </p:seq>
+          </p:childTnLst>
+        </p:cTn>
+      </p:par>
+    </p:tnLst>
+    <p:bldLst>
+      <p:bldP spid="2" grpId="0" animBg="1"/>
+      <p:bldP spid="4" grpId="0" animBg="1"/>
+      <p:bldP spid="5" grpId="0" animBg="1"/>
+      <p:bldP spid="6" grpId="0" animBg="1"/>
+      <p:bldP spid="75" grpId="0" animBg="1"/>
+      <p:bldP spid="85" grpId="0"/>
+      <p:bldP spid="29" grpId="0"/>
+    </p:bldLst>
+  </p:timing>
 </p:sld>
 </file>
 
@@ -3980,17 +4571,542 @@
                   <a:schemeClr val="tx1"/>
                 </a:solidFill>
               </a:rPr>
-              <a:t>Execution</a:t>
-            </a:r>
-          </a:p>
-        </p:txBody>
-      </p:sp>
-      <p:sp>
-        <p:nvSpPr>
-          <p:cNvPr id="3" name="Oval 2">
-            <a:extLst>
-              <a:ext uri="{FF2B5EF4-FFF2-40B4-BE49-F238E27FC236}">
-                <a16:creationId xmlns:a16="http://schemas.microsoft.com/office/drawing/2014/main" id="{4CAA13D0-0843-4970-A947-8933171577A2}"/>
+              <a:t>Execute</a:t>
+            </a:r>
+          </a:p>
+        </p:txBody>
+      </p:sp>
+      <p:sp>
+        <p:nvSpPr>
+          <p:cNvPr id="4" name="Oval 3">
+            <a:extLst>
+              <a:ext uri="{FF2B5EF4-FFF2-40B4-BE49-F238E27FC236}">
+                <a16:creationId xmlns:a16="http://schemas.microsoft.com/office/drawing/2014/main" id="{054D106C-15BF-448E-9A60-38A5345EAD19}"/>
+              </a:ext>
+            </a:extLst>
+          </p:cNvPr>
+          <p:cNvSpPr/>
+          <p:nvPr/>
+        </p:nvSpPr>
+        <p:spPr>
+          <a:xfrm>
+            <a:off x="7438112" y="2268222"/>
+            <a:ext cx="2054352" cy="731520"/>
+          </a:xfrm>
+          <a:prstGeom prst="ellipse">
+            <a:avLst/>
+          </a:prstGeom>
+          <a:noFill/>
+          <a:ln w="28575"/>
+        </p:spPr>
+        <p:style>
+          <a:lnRef idx="2">
+            <a:schemeClr val="accent1">
+              <a:shade val="50000"/>
+            </a:schemeClr>
+          </a:lnRef>
+          <a:fillRef idx="1">
+            <a:schemeClr val="accent1"/>
+          </a:fillRef>
+          <a:effectRef idx="0">
+            <a:schemeClr val="accent1"/>
+          </a:effectRef>
+          <a:fontRef idx="minor">
+            <a:schemeClr val="lt1"/>
+          </a:fontRef>
+        </p:style>
+        <p:txBody>
+          <a:bodyPr rtlCol="0" anchor="ctr"/>
+          <a:lstStyle/>
+          <a:p>
+            <a:pPr algn="ctr"/>
+            <a:r>
+              <a:rPr lang="en-US" dirty="0">
+                <a:solidFill>
+                  <a:schemeClr val="tx1"/>
+                </a:solidFill>
+              </a:rPr>
+              <a:t>Commitment</a:t>
+            </a:r>
+          </a:p>
+        </p:txBody>
+      </p:sp>
+      <p:sp>
+        <p:nvSpPr>
+          <p:cNvPr id="5" name="Oval 4">
+            <a:extLst>
+              <a:ext uri="{FF2B5EF4-FFF2-40B4-BE49-F238E27FC236}">
+                <a16:creationId xmlns:a16="http://schemas.microsoft.com/office/drawing/2014/main" id="{B63B4930-7C2A-46CB-B169-397B0F16E318}"/>
+              </a:ext>
+            </a:extLst>
+          </p:cNvPr>
+          <p:cNvSpPr/>
+          <p:nvPr/>
+        </p:nvSpPr>
+        <p:spPr>
+          <a:xfrm>
+            <a:off x="7642328" y="4779931"/>
+            <a:ext cx="1645920" cy="731520"/>
+          </a:xfrm>
+          <a:prstGeom prst="ellipse">
+            <a:avLst/>
+          </a:prstGeom>
+          <a:noFill/>
+          <a:ln w="28575"/>
+        </p:spPr>
+        <p:style>
+          <a:lnRef idx="2">
+            <a:schemeClr val="accent1">
+              <a:shade val="50000"/>
+            </a:schemeClr>
+          </a:lnRef>
+          <a:fillRef idx="1">
+            <a:schemeClr val="accent1"/>
+          </a:fillRef>
+          <a:effectRef idx="0">
+            <a:schemeClr val="accent1"/>
+          </a:effectRef>
+          <a:fontRef idx="minor">
+            <a:schemeClr val="lt1"/>
+          </a:fontRef>
+        </p:style>
+        <p:txBody>
+          <a:bodyPr rtlCol="0" anchor="ctr"/>
+          <a:lstStyle/>
+          <a:p>
+            <a:pPr algn="ctr"/>
+            <a:r>
+              <a:rPr lang="en-US" dirty="0">
+                <a:solidFill>
+                  <a:schemeClr val="tx1"/>
+                </a:solidFill>
+              </a:rPr>
+              <a:t>Assess</a:t>
+            </a:r>
+          </a:p>
+        </p:txBody>
+      </p:sp>
+      <p:sp>
+        <p:nvSpPr>
+          <p:cNvPr id="6" name="Oval 5">
+            <a:extLst>
+              <a:ext uri="{FF2B5EF4-FFF2-40B4-BE49-F238E27FC236}">
+                <a16:creationId xmlns:a16="http://schemas.microsoft.com/office/drawing/2014/main" id="{04F590A8-7F59-4211-B3CE-7A74FEB3714E}"/>
+              </a:ext>
+            </a:extLst>
+          </p:cNvPr>
+          <p:cNvSpPr/>
+          <p:nvPr/>
+        </p:nvSpPr>
+        <p:spPr>
+          <a:xfrm>
+            <a:off x="9288248" y="4094726"/>
+            <a:ext cx="1645920" cy="731520"/>
+          </a:xfrm>
+          <a:prstGeom prst="ellipse">
+            <a:avLst/>
+          </a:prstGeom>
+          <a:solidFill>
+            <a:schemeClr val="accent2">
+              <a:lumMod val="40000"/>
+              <a:lumOff val="60000"/>
+            </a:schemeClr>
+          </a:solidFill>
+          <a:ln w="28575"/>
+        </p:spPr>
+        <p:style>
+          <a:lnRef idx="2">
+            <a:schemeClr val="accent1">
+              <a:shade val="50000"/>
+            </a:schemeClr>
+          </a:lnRef>
+          <a:fillRef idx="1">
+            <a:schemeClr val="accent1"/>
+          </a:fillRef>
+          <a:effectRef idx="0">
+            <a:schemeClr val="accent1"/>
+          </a:effectRef>
+          <a:fontRef idx="minor">
+            <a:schemeClr val="lt1"/>
+          </a:fontRef>
+        </p:style>
+        <p:txBody>
+          <a:bodyPr rtlCol="0" anchor="ctr"/>
+          <a:lstStyle/>
+          <a:p>
+            <a:pPr algn="ctr"/>
+            <a:r>
+              <a:rPr lang="en-US" dirty="0">
+                <a:solidFill>
+                  <a:schemeClr val="tx1"/>
+                </a:solidFill>
+              </a:rPr>
+              <a:t>Feedback</a:t>
+            </a:r>
+          </a:p>
+        </p:txBody>
+      </p:sp>
+      <p:sp>
+        <p:nvSpPr>
+          <p:cNvPr id="9" name="TextBox 8">
+            <a:extLst>
+              <a:ext uri="{FF2B5EF4-FFF2-40B4-BE49-F238E27FC236}">
+                <a16:creationId xmlns:a16="http://schemas.microsoft.com/office/drawing/2014/main" id="{3A496956-7CE1-4753-8FCA-247F6A957F97}"/>
+              </a:ext>
+            </a:extLst>
+          </p:cNvPr>
+          <p:cNvSpPr txBox="1"/>
+          <p:nvPr/>
+        </p:nvSpPr>
+        <p:spPr>
+          <a:xfrm>
+            <a:off x="10268691" y="3700377"/>
+            <a:ext cx="825867" cy="369332"/>
+          </a:xfrm>
+          <a:prstGeom prst="rect">
+            <a:avLst/>
+          </a:prstGeom>
+          <a:noFill/>
+        </p:spPr>
+        <p:txBody>
+          <a:bodyPr wrap="none" rtlCol="0">
+            <a:spAutoFit/>
+          </a:bodyPr>
+          <a:lstStyle/>
+          <a:p>
+            <a:r>
+              <a:rPr lang="en-US" dirty="0">
+                <a:solidFill>
+                  <a:srgbClr val="F09456"/>
+                </a:solidFill>
+              </a:rPr>
+              <a:t>Leader</a:t>
+            </a:r>
+          </a:p>
+        </p:txBody>
+      </p:sp>
+      <p:sp>
+        <p:nvSpPr>
+          <p:cNvPr id="10" name="TextBox 9">
+            <a:extLst>
+              <a:ext uri="{FF2B5EF4-FFF2-40B4-BE49-F238E27FC236}">
+                <a16:creationId xmlns:a16="http://schemas.microsoft.com/office/drawing/2014/main" id="{174A2CEC-EB6A-41A1-B458-E3858BC6759F}"/>
+              </a:ext>
+            </a:extLst>
+          </p:cNvPr>
+          <p:cNvSpPr txBox="1"/>
+          <p:nvPr/>
+        </p:nvSpPr>
+        <p:spPr>
+          <a:xfrm>
+            <a:off x="5443566" y="3755295"/>
+            <a:ext cx="686726" cy="369332"/>
+          </a:xfrm>
+          <a:prstGeom prst="rect">
+            <a:avLst/>
+          </a:prstGeom>
+          <a:noFill/>
+        </p:spPr>
+        <p:txBody>
+          <a:bodyPr wrap="none" rtlCol="0">
+            <a:spAutoFit/>
+          </a:bodyPr>
+          <a:lstStyle/>
+          <a:p>
+            <a:r>
+              <a:rPr lang="en-US" dirty="0">
+                <a:solidFill>
+                  <a:schemeClr val="accent1">
+                    <a:lumMod val="75000"/>
+                  </a:schemeClr>
+                </a:solidFill>
+              </a:rPr>
+              <a:t>Team</a:t>
+            </a:r>
+          </a:p>
+        </p:txBody>
+      </p:sp>
+      <p:cxnSp>
+        <p:nvCxnSpPr>
+          <p:cNvPr id="19" name="Connector: Curved 18">
+            <a:extLst>
+              <a:ext uri="{FF2B5EF4-FFF2-40B4-BE49-F238E27FC236}">
+                <a16:creationId xmlns:a16="http://schemas.microsoft.com/office/drawing/2014/main" id="{CE3921C5-1C91-4967-85A7-C67AB731B4AA}"/>
+              </a:ext>
+            </a:extLst>
+          </p:cNvPr>
+          <p:cNvCxnSpPr>
+            <a:stCxn id="5" idx="6"/>
+            <a:endCxn id="6" idx="4"/>
+          </p:cNvCxnSpPr>
+          <p:nvPr/>
+        </p:nvCxnSpPr>
+        <p:spPr>
+          <a:xfrm flipV="1">
+            <a:off x="9288248" y="4826246"/>
+            <a:ext cx="822960" cy="319445"/>
+          </a:xfrm>
+          <a:prstGeom prst="curvedConnector2">
+            <a:avLst/>
+          </a:prstGeom>
+          <a:ln w="38100">
+            <a:tailEnd type="triangle"/>
+          </a:ln>
+        </p:spPr>
+        <p:style>
+          <a:lnRef idx="1">
+            <a:schemeClr val="accent1"/>
+          </a:lnRef>
+          <a:fillRef idx="0">
+            <a:schemeClr val="accent1"/>
+          </a:fillRef>
+          <a:effectRef idx="0">
+            <a:schemeClr val="accent1"/>
+          </a:effectRef>
+          <a:fontRef idx="minor">
+            <a:schemeClr val="tx1"/>
+          </a:fontRef>
+        </p:style>
+      </p:cxnSp>
+      <p:cxnSp>
+        <p:nvCxnSpPr>
+          <p:cNvPr id="20" name="Connector: Curved 19">
+            <a:extLst>
+              <a:ext uri="{FF2B5EF4-FFF2-40B4-BE49-F238E27FC236}">
+                <a16:creationId xmlns:a16="http://schemas.microsoft.com/office/drawing/2014/main" id="{C609C0A7-2BD3-437B-A7F4-49CA496BFDCD}"/>
+              </a:ext>
+            </a:extLst>
+          </p:cNvPr>
+          <p:cNvCxnSpPr>
+            <a:cxnSpLocks/>
+            <a:stCxn id="4" idx="2"/>
+            <a:endCxn id="2" idx="7"/>
+          </p:cNvCxnSpPr>
+          <p:nvPr/>
+        </p:nvCxnSpPr>
+        <p:spPr>
+          <a:xfrm rot="10800000" flipV="1">
+            <a:off x="6824226" y="2633981"/>
+            <a:ext cx="613887" cy="1567873"/>
+          </a:xfrm>
+          <a:prstGeom prst="curvedConnector2">
+            <a:avLst/>
+          </a:prstGeom>
+          <a:ln w="38100">
+            <a:tailEnd type="triangle"/>
+          </a:ln>
+        </p:spPr>
+        <p:style>
+          <a:lnRef idx="1">
+            <a:schemeClr val="accent1"/>
+          </a:lnRef>
+          <a:fillRef idx="0">
+            <a:schemeClr val="accent1"/>
+          </a:fillRef>
+          <a:effectRef idx="0">
+            <a:schemeClr val="accent1"/>
+          </a:effectRef>
+          <a:fontRef idx="minor">
+            <a:schemeClr val="tx1"/>
+          </a:fontRef>
+        </p:style>
+      </p:cxnSp>
+      <p:cxnSp>
+        <p:nvCxnSpPr>
+          <p:cNvPr id="24" name="Connector: Curved 23">
+            <a:extLst>
+              <a:ext uri="{FF2B5EF4-FFF2-40B4-BE49-F238E27FC236}">
+                <a16:creationId xmlns:a16="http://schemas.microsoft.com/office/drawing/2014/main" id="{B1537C06-439B-4019-8281-B14E43DF6F53}"/>
+              </a:ext>
+            </a:extLst>
+          </p:cNvPr>
+          <p:cNvCxnSpPr>
+            <a:cxnSpLocks/>
+            <a:stCxn id="2" idx="5"/>
+            <a:endCxn id="5" idx="2"/>
+          </p:cNvCxnSpPr>
+          <p:nvPr/>
+        </p:nvCxnSpPr>
+        <p:spPr>
+          <a:xfrm rot="16200000" flipH="1">
+            <a:off x="7019989" y="4523352"/>
+            <a:ext cx="426574" cy="818103"/>
+          </a:xfrm>
+          <a:prstGeom prst="curvedConnector2">
+            <a:avLst/>
+          </a:prstGeom>
+          <a:ln w="38100">
+            <a:tailEnd type="triangle"/>
+          </a:ln>
+        </p:spPr>
+        <p:style>
+          <a:lnRef idx="1">
+            <a:schemeClr val="accent1"/>
+          </a:lnRef>
+          <a:fillRef idx="0">
+            <a:schemeClr val="accent1"/>
+          </a:fillRef>
+          <a:effectRef idx="0">
+            <a:schemeClr val="accent1"/>
+          </a:effectRef>
+          <a:fontRef idx="minor">
+            <a:schemeClr val="tx1"/>
+          </a:fontRef>
+        </p:style>
+      </p:cxnSp>
+      <p:cxnSp>
+        <p:nvCxnSpPr>
+          <p:cNvPr id="25" name="Connector: Curved 24">
+            <a:extLst>
+              <a:ext uri="{FF2B5EF4-FFF2-40B4-BE49-F238E27FC236}">
+                <a16:creationId xmlns:a16="http://schemas.microsoft.com/office/drawing/2014/main" id="{CA54429C-6FC4-4A94-8FE0-A0A5A292DC21}"/>
+              </a:ext>
+            </a:extLst>
+          </p:cNvPr>
+          <p:cNvCxnSpPr>
+            <a:cxnSpLocks/>
+            <a:stCxn id="6" idx="0"/>
+            <a:endCxn id="21" idx="4"/>
+          </p:cNvCxnSpPr>
+          <p:nvPr/>
+        </p:nvCxnSpPr>
+        <p:spPr>
+          <a:xfrm rot="5400000" flipH="1" flipV="1">
+            <a:off x="9914593" y="3898111"/>
+            <a:ext cx="393230" cy="12700"/>
+          </a:xfrm>
+          <a:prstGeom prst="curvedConnector3">
+            <a:avLst>
+              <a:gd name="adj1" fmla="val 50000"/>
+            </a:avLst>
+          </a:prstGeom>
+          <a:ln w="38100">
+            <a:tailEnd type="triangle"/>
+          </a:ln>
+        </p:spPr>
+        <p:style>
+          <a:lnRef idx="1">
+            <a:schemeClr val="accent1"/>
+          </a:lnRef>
+          <a:fillRef idx="0">
+            <a:schemeClr val="accent1"/>
+          </a:fillRef>
+          <a:effectRef idx="0">
+            <a:schemeClr val="accent1"/>
+          </a:effectRef>
+          <a:fontRef idx="minor">
+            <a:schemeClr val="tx1"/>
+          </a:fontRef>
+        </p:style>
+      </p:cxnSp>
+      <p:sp>
+        <p:nvSpPr>
+          <p:cNvPr id="21" name="Oval 20">
+            <a:extLst>
+              <a:ext uri="{FF2B5EF4-FFF2-40B4-BE49-F238E27FC236}">
+                <a16:creationId xmlns:a16="http://schemas.microsoft.com/office/drawing/2014/main" id="{9D6D71A2-9BE7-4CA4-9966-5A1B756D7120}"/>
+              </a:ext>
+            </a:extLst>
+          </p:cNvPr>
+          <p:cNvSpPr/>
+          <p:nvPr/>
+        </p:nvSpPr>
+        <p:spPr>
+          <a:xfrm>
+            <a:off x="9288248" y="2969976"/>
+            <a:ext cx="1645920" cy="731520"/>
+          </a:xfrm>
+          <a:prstGeom prst="ellipse">
+            <a:avLst/>
+          </a:prstGeom>
+          <a:solidFill>
+            <a:schemeClr val="accent2">
+              <a:lumMod val="40000"/>
+              <a:lumOff val="60000"/>
+            </a:schemeClr>
+          </a:solidFill>
+          <a:ln w="28575"/>
+        </p:spPr>
+        <p:style>
+          <a:lnRef idx="2">
+            <a:schemeClr val="accent1">
+              <a:shade val="50000"/>
+            </a:schemeClr>
+          </a:lnRef>
+          <a:fillRef idx="1">
+            <a:schemeClr val="accent1"/>
+          </a:fillRef>
+          <a:effectRef idx="0">
+            <a:schemeClr val="accent1"/>
+          </a:effectRef>
+          <a:fontRef idx="minor">
+            <a:schemeClr val="lt1"/>
+          </a:fontRef>
+        </p:style>
+        <p:txBody>
+          <a:bodyPr rtlCol="0" anchor="ctr"/>
+          <a:lstStyle/>
+          <a:p>
+            <a:pPr algn="ctr"/>
+            <a:r>
+              <a:rPr lang="en-US" dirty="0">
+                <a:solidFill>
+                  <a:schemeClr val="tx1"/>
+                </a:solidFill>
+              </a:rPr>
+              <a:t>Direction</a:t>
+            </a:r>
+          </a:p>
+        </p:txBody>
+      </p:sp>
+      <p:cxnSp>
+        <p:nvCxnSpPr>
+          <p:cNvPr id="22" name="Connector: Curved 21">
+            <a:extLst>
+              <a:ext uri="{FF2B5EF4-FFF2-40B4-BE49-F238E27FC236}">
+                <a16:creationId xmlns:a16="http://schemas.microsoft.com/office/drawing/2014/main" id="{F1B44C3D-E3C8-45AD-9768-257517B3CE17}"/>
+              </a:ext>
+            </a:extLst>
+          </p:cNvPr>
+          <p:cNvCxnSpPr>
+            <a:stCxn id="21" idx="0"/>
+            <a:endCxn id="4" idx="6"/>
+          </p:cNvCxnSpPr>
+          <p:nvPr/>
+        </p:nvCxnSpPr>
+        <p:spPr>
+          <a:xfrm rot="16200000" flipV="1">
+            <a:off x="9633839" y="2492607"/>
+            <a:ext cx="335994" cy="618744"/>
+          </a:xfrm>
+          <a:prstGeom prst="curvedConnector2">
+            <a:avLst/>
+          </a:prstGeom>
+          <a:ln w="38100">
+            <a:tailEnd type="triangle"/>
+          </a:ln>
+        </p:spPr>
+        <p:style>
+          <a:lnRef idx="3">
+            <a:schemeClr val="accent1"/>
+          </a:lnRef>
+          <a:fillRef idx="0">
+            <a:schemeClr val="accent1"/>
+          </a:fillRef>
+          <a:effectRef idx="2">
+            <a:schemeClr val="accent1"/>
+          </a:effectRef>
+          <a:fontRef idx="minor">
+            <a:schemeClr val="tx1"/>
+          </a:fontRef>
+        </p:style>
+      </p:cxnSp>
+      <p:sp>
+        <p:nvSpPr>
+          <p:cNvPr id="16" name="Oval 15">
+            <a:extLst>
+              <a:ext uri="{FF2B5EF4-FFF2-40B4-BE49-F238E27FC236}">
+                <a16:creationId xmlns:a16="http://schemas.microsoft.com/office/drawing/2014/main" id="{F5467CAE-C6F5-4457-A3F0-44045D635ACB}"/>
               </a:ext>
             </a:extLst>
           </p:cNvPr>
@@ -4040,187 +5156,17 @@
                   <a:schemeClr val="tx1"/>
                 </a:solidFill>
               </a:rPr>
-              <a:t>Decision</a:t>
-            </a:r>
-          </a:p>
-        </p:txBody>
-      </p:sp>
-      <p:sp>
-        <p:nvSpPr>
-          <p:cNvPr id="4" name="Oval 3">
-            <a:extLst>
-              <a:ext uri="{FF2B5EF4-FFF2-40B4-BE49-F238E27FC236}">
-                <a16:creationId xmlns:a16="http://schemas.microsoft.com/office/drawing/2014/main" id="{054D106C-15BF-448E-9A60-38A5345EAD19}"/>
-              </a:ext>
-            </a:extLst>
-          </p:cNvPr>
-          <p:cNvSpPr/>
-          <p:nvPr/>
-        </p:nvSpPr>
-        <p:spPr>
-          <a:xfrm>
-            <a:off x="7442859" y="2811110"/>
-            <a:ext cx="2054352" cy="731520"/>
-          </a:xfrm>
-          <a:prstGeom prst="ellipse">
-            <a:avLst/>
-          </a:prstGeom>
-          <a:noFill/>
-          <a:ln w="28575"/>
-        </p:spPr>
-        <p:style>
-          <a:lnRef idx="2">
-            <a:schemeClr val="accent1">
-              <a:shade val="50000"/>
-            </a:schemeClr>
-          </a:lnRef>
-          <a:fillRef idx="1">
-            <a:schemeClr val="accent1"/>
-          </a:fillRef>
-          <a:effectRef idx="0">
-            <a:schemeClr val="accent1"/>
-          </a:effectRef>
-          <a:fontRef idx="minor">
-            <a:schemeClr val="lt1"/>
-          </a:fontRef>
-        </p:style>
-        <p:txBody>
-          <a:bodyPr rtlCol="0" anchor="ctr"/>
-          <a:lstStyle/>
-          <a:p>
-            <a:pPr algn="ctr"/>
-            <a:r>
-              <a:rPr lang="en-US" dirty="0">
-                <a:solidFill>
-                  <a:schemeClr val="tx1"/>
-                </a:solidFill>
-              </a:rPr>
-              <a:t>Commitment</a:t>
-            </a:r>
-          </a:p>
-        </p:txBody>
-      </p:sp>
-      <p:sp>
-        <p:nvSpPr>
-          <p:cNvPr id="5" name="Oval 4">
-            <a:extLst>
-              <a:ext uri="{FF2B5EF4-FFF2-40B4-BE49-F238E27FC236}">
-                <a16:creationId xmlns:a16="http://schemas.microsoft.com/office/drawing/2014/main" id="{B63B4930-7C2A-46CB-B169-397B0F16E318}"/>
-              </a:ext>
-            </a:extLst>
-          </p:cNvPr>
-          <p:cNvSpPr/>
-          <p:nvPr/>
-        </p:nvSpPr>
-        <p:spPr>
-          <a:xfrm>
-            <a:off x="7642328" y="4543288"/>
-            <a:ext cx="1645920" cy="731520"/>
-          </a:xfrm>
-          <a:prstGeom prst="ellipse">
-            <a:avLst/>
-          </a:prstGeom>
-          <a:noFill/>
-          <a:ln w="28575"/>
-        </p:spPr>
-        <p:style>
-          <a:lnRef idx="2">
-            <a:schemeClr val="accent1">
-              <a:shade val="50000"/>
-            </a:schemeClr>
-          </a:lnRef>
-          <a:fillRef idx="1">
-            <a:schemeClr val="accent1"/>
-          </a:fillRef>
-          <a:effectRef idx="0">
-            <a:schemeClr val="accent1"/>
-          </a:effectRef>
-          <a:fontRef idx="minor">
-            <a:schemeClr val="lt1"/>
-          </a:fontRef>
-        </p:style>
-        <p:txBody>
-          <a:bodyPr rtlCol="0" anchor="ctr"/>
-          <a:lstStyle/>
-          <a:p>
-            <a:pPr algn="ctr"/>
-            <a:r>
-              <a:rPr lang="en-US" dirty="0">
-                <a:solidFill>
-                  <a:schemeClr val="tx1"/>
-                </a:solidFill>
-              </a:rPr>
-              <a:t>Assess</a:t>
-            </a:r>
-          </a:p>
-        </p:txBody>
-      </p:sp>
-      <p:sp>
-        <p:nvSpPr>
-          <p:cNvPr id="6" name="Oval 5">
-            <a:extLst>
-              <a:ext uri="{FF2B5EF4-FFF2-40B4-BE49-F238E27FC236}">
-                <a16:creationId xmlns:a16="http://schemas.microsoft.com/office/drawing/2014/main" id="{04F590A8-7F59-4211-B3CE-7A74FEB3714E}"/>
-              </a:ext>
-            </a:extLst>
-          </p:cNvPr>
-          <p:cNvSpPr/>
-          <p:nvPr/>
-        </p:nvSpPr>
-        <p:spPr>
-          <a:xfrm>
-            <a:off x="9239805" y="3812673"/>
-            <a:ext cx="1645920" cy="731520"/>
-          </a:xfrm>
-          <a:prstGeom prst="ellipse">
-            <a:avLst/>
-          </a:prstGeom>
-          <a:solidFill>
-            <a:schemeClr val="accent2">
-              <a:lumMod val="40000"/>
-              <a:lumOff val="60000"/>
-            </a:schemeClr>
-          </a:solidFill>
-          <a:ln w="28575"/>
-        </p:spPr>
-        <p:style>
-          <a:lnRef idx="2">
-            <a:schemeClr val="accent1">
-              <a:shade val="50000"/>
-            </a:schemeClr>
-          </a:lnRef>
-          <a:fillRef idx="1">
-            <a:schemeClr val="accent1"/>
-          </a:fillRef>
-          <a:effectRef idx="0">
-            <a:schemeClr val="accent1"/>
-          </a:effectRef>
-          <a:fontRef idx="minor">
-            <a:schemeClr val="lt1"/>
-          </a:fontRef>
-        </p:style>
-        <p:txBody>
-          <a:bodyPr rtlCol="0" anchor="ctr"/>
-          <a:lstStyle/>
-          <a:p>
-            <a:pPr algn="ctr"/>
-            <a:r>
-              <a:rPr lang="en-US" dirty="0">
-                <a:solidFill>
-                  <a:schemeClr val="tx1"/>
-                </a:solidFill>
-              </a:rPr>
-              <a:t>Feedback</a:t>
-            </a:r>
-          </a:p>
-        </p:txBody>
-      </p:sp>
-      <p:sp>
-        <p:nvSpPr>
-          <p:cNvPr id="8" name="Oval 7">
-            <a:extLst>
-              <a:ext uri="{FF2B5EF4-FFF2-40B4-BE49-F238E27FC236}">
-                <a16:creationId xmlns:a16="http://schemas.microsoft.com/office/drawing/2014/main" id="{A6EDD052-18D7-4A33-BCB1-7602A2A3536F}"/>
+              <a:t>Direction</a:t>
+            </a:r>
+          </a:p>
+        </p:txBody>
+      </p:sp>
+      <p:sp>
+        <p:nvSpPr>
+          <p:cNvPr id="17" name="Oval 16">
+            <a:extLst>
+              <a:ext uri="{FF2B5EF4-FFF2-40B4-BE49-F238E27FC236}">
+                <a16:creationId xmlns:a16="http://schemas.microsoft.com/office/drawing/2014/main" id="{1A03C2EE-4E91-4E16-BC96-047376D7C7D7}"/>
               </a:ext>
             </a:extLst>
           </p:cNvPr>
@@ -4277,90 +5223,10 @@
       </p:sp>
       <p:sp>
         <p:nvSpPr>
-          <p:cNvPr id="9" name="TextBox 8">
-            <a:extLst>
-              <a:ext uri="{FF2B5EF4-FFF2-40B4-BE49-F238E27FC236}">
-                <a16:creationId xmlns:a16="http://schemas.microsoft.com/office/drawing/2014/main" id="{3A496956-7CE1-4753-8FCA-247F6A957F97}"/>
-              </a:ext>
-            </a:extLst>
-          </p:cNvPr>
-          <p:cNvSpPr txBox="1"/>
-          <p:nvPr/>
-        </p:nvSpPr>
-        <p:spPr>
-          <a:xfrm>
-            <a:off x="9219020" y="3445579"/>
-            <a:ext cx="825867" cy="369332"/>
-          </a:xfrm>
-          <a:prstGeom prst="rect">
-            <a:avLst/>
-          </a:prstGeom>
-          <a:noFill/>
-        </p:spPr>
-        <p:txBody>
-          <a:bodyPr wrap="none" rtlCol="0">
-            <a:spAutoFit/>
-          </a:bodyPr>
-          <a:lstStyle/>
-          <a:p>
-            <a:r>
-              <a:rPr lang="en-US" dirty="0">
-                <a:solidFill>
-                  <a:srgbClr val="F09456"/>
-                </a:solidFill>
-              </a:rPr>
-              <a:t>Leader</a:t>
-            </a:r>
-          </a:p>
-        </p:txBody>
-      </p:sp>
-      <p:sp>
-        <p:nvSpPr>
-          <p:cNvPr id="10" name="TextBox 9">
-            <a:extLst>
-              <a:ext uri="{FF2B5EF4-FFF2-40B4-BE49-F238E27FC236}">
-                <a16:creationId xmlns:a16="http://schemas.microsoft.com/office/drawing/2014/main" id="{174A2CEC-EB6A-41A1-B458-E3858BC6759F}"/>
-              </a:ext>
-            </a:extLst>
-          </p:cNvPr>
-          <p:cNvSpPr txBox="1"/>
-          <p:nvPr/>
-        </p:nvSpPr>
-        <p:spPr>
-          <a:xfrm>
-            <a:off x="5443566" y="3755295"/>
-            <a:ext cx="686726" cy="369332"/>
-          </a:xfrm>
-          <a:prstGeom prst="rect">
-            <a:avLst/>
-          </a:prstGeom>
-          <a:noFill/>
-        </p:spPr>
-        <p:txBody>
-          <a:bodyPr wrap="none" rtlCol="0">
-            <a:spAutoFit/>
-          </a:bodyPr>
-          <a:lstStyle/>
-          <a:p>
-            <a:r>
-              <a:rPr lang="en-US" dirty="0">
-                <a:solidFill>
-                  <a:schemeClr val="accent1">
-                    <a:lumMod val="75000"/>
-                  </a:schemeClr>
-                </a:solidFill>
-              </a:rPr>
-              <a:t>Team</a:t>
-            </a:r>
-          </a:p>
-        </p:txBody>
-      </p:sp>
-      <p:sp>
-        <p:nvSpPr>
-          <p:cNvPr id="11" name="Rectangle: Rounded Corners 10">
-            <a:extLst>
-              <a:ext uri="{FF2B5EF4-FFF2-40B4-BE49-F238E27FC236}">
-                <a16:creationId xmlns:a16="http://schemas.microsoft.com/office/drawing/2014/main" id="{1592A05E-A27F-406A-B192-0BCE3574B3C6}"/>
+          <p:cNvPr id="18" name="Rectangle: Rounded Corners 17">
+            <a:extLst>
+              <a:ext uri="{FF2B5EF4-FFF2-40B4-BE49-F238E27FC236}">
+                <a16:creationId xmlns:a16="http://schemas.microsoft.com/office/drawing/2014/main" id="{70B13BEE-852E-4C1E-A7DC-593751946B9E}"/>
               </a:ext>
             </a:extLst>
           </p:cNvPr>
@@ -4407,23 +5273,24 @@
       </p:sp>
       <p:cxnSp>
         <p:nvCxnSpPr>
-          <p:cNvPr id="19" name="Connector: Curved 18">
-            <a:extLst>
-              <a:ext uri="{FF2B5EF4-FFF2-40B4-BE49-F238E27FC236}">
-                <a16:creationId xmlns:a16="http://schemas.microsoft.com/office/drawing/2014/main" id="{CE3921C5-1C91-4967-85A7-C67AB731B4AA}"/>
+          <p:cNvPr id="23" name="Connector: Curved 22">
+            <a:extLst>
+              <a:ext uri="{FF2B5EF4-FFF2-40B4-BE49-F238E27FC236}">
+                <a16:creationId xmlns:a16="http://schemas.microsoft.com/office/drawing/2014/main" id="{94F89EF5-34A3-40FC-B3B1-9CFBBD3299A1}"/>
               </a:ext>
             </a:extLst>
           </p:cNvPr>
           <p:cNvCxnSpPr>
-            <a:stCxn id="5" idx="6"/>
-            <a:endCxn id="6" idx="4"/>
+            <a:cxnSpLocks/>
+            <a:stCxn id="2" idx="0"/>
+            <a:endCxn id="17" idx="6"/>
           </p:cNvCxnSpPr>
           <p:nvPr/>
         </p:nvCxnSpPr>
         <p:spPr>
-          <a:xfrm flipV="1">
-            <a:off x="9288248" y="4544193"/>
-            <a:ext cx="774517" cy="364855"/>
+          <a:xfrm rot="16200000" flipV="1">
+            <a:off x="4956450" y="2808872"/>
+            <a:ext cx="1883794" cy="687914"/>
           </a:xfrm>
           <a:prstGeom prst="curvedConnector2">
             <a:avLst/>
@@ -4449,24 +5316,24 @@
       </p:cxnSp>
       <p:cxnSp>
         <p:nvCxnSpPr>
-          <p:cNvPr id="20" name="Connector: Curved 19">
-            <a:extLst>
-              <a:ext uri="{FF2B5EF4-FFF2-40B4-BE49-F238E27FC236}">
-                <a16:creationId xmlns:a16="http://schemas.microsoft.com/office/drawing/2014/main" id="{C609C0A7-2BD3-437B-A7F4-49CA496BFDCD}"/>
+          <p:cNvPr id="26" name="Connector: Curved 25">
+            <a:extLst>
+              <a:ext uri="{FF2B5EF4-FFF2-40B4-BE49-F238E27FC236}">
+                <a16:creationId xmlns:a16="http://schemas.microsoft.com/office/drawing/2014/main" id="{77123615-CD96-4D7D-B5A7-C53BC52B6ACA}"/>
               </a:ext>
             </a:extLst>
           </p:cNvPr>
           <p:cNvCxnSpPr>
             <a:cxnSpLocks/>
-            <a:stCxn id="4" idx="2"/>
-            <a:endCxn id="2" idx="7"/>
+            <a:stCxn id="16" idx="4"/>
+            <a:endCxn id="2" idx="2"/>
           </p:cNvCxnSpPr>
           <p:nvPr/>
         </p:nvCxnSpPr>
         <p:spPr>
-          <a:xfrm rot="10800000" flipV="1">
-            <a:off x="6824225" y="3176869"/>
-            <a:ext cx="618634" cy="1024985"/>
+          <a:xfrm rot="16200000" flipH="1">
+            <a:off x="4175174" y="3216316"/>
+            <a:ext cx="599954" cy="1888386"/>
           </a:xfrm>
           <a:prstGeom prst="curvedConnector2">
             <a:avLst/>
@@ -4492,24 +5359,24 @@
       </p:cxnSp>
       <p:cxnSp>
         <p:nvCxnSpPr>
-          <p:cNvPr id="21" name="Connector: Curved 20">
-            <a:extLst>
-              <a:ext uri="{FF2B5EF4-FFF2-40B4-BE49-F238E27FC236}">
-                <a16:creationId xmlns:a16="http://schemas.microsoft.com/office/drawing/2014/main" id="{2A226C98-BC87-485C-92A2-B40A1CF0D019}"/>
+          <p:cNvPr id="27" name="Connector: Curved 26">
+            <a:extLst>
+              <a:ext uri="{FF2B5EF4-FFF2-40B4-BE49-F238E27FC236}">
+                <a16:creationId xmlns:a16="http://schemas.microsoft.com/office/drawing/2014/main" id="{0CFBBDE4-12D9-42F2-94D7-AC8BE054F727}"/>
               </a:ext>
             </a:extLst>
           </p:cNvPr>
           <p:cNvCxnSpPr>
             <a:cxnSpLocks/>
-            <a:stCxn id="2" idx="0"/>
-            <a:endCxn id="8" idx="6"/>
+            <a:stCxn id="17" idx="2"/>
+            <a:endCxn id="16" idx="0"/>
           </p:cNvCxnSpPr>
           <p:nvPr/>
         </p:nvCxnSpPr>
         <p:spPr>
-          <a:xfrm rot="16200000" flipV="1">
-            <a:off x="4956450" y="2808872"/>
-            <a:ext cx="1883794" cy="687914"/>
+          <a:xfrm rot="10800000" flipV="1">
+            <a:off x="3530958" y="2210932"/>
+            <a:ext cx="377512" cy="918080"/>
           </a:xfrm>
           <a:prstGeom prst="curvedConnector2">
             <a:avLst/>
@@ -4533,204 +5400,66 @@
           </a:fontRef>
         </p:style>
       </p:cxnSp>
-      <p:cxnSp>
-        <p:nvCxnSpPr>
-          <p:cNvPr id="22" name="Connector: Curved 21">
-            <a:extLst>
-              <a:ext uri="{FF2B5EF4-FFF2-40B4-BE49-F238E27FC236}">
-                <a16:creationId xmlns:a16="http://schemas.microsoft.com/office/drawing/2014/main" id="{0F934F1D-FBD7-47E4-9158-E11160668588}"/>
-              </a:ext>
-            </a:extLst>
-          </p:cNvPr>
-          <p:cNvCxnSpPr>
-            <a:cxnSpLocks/>
-            <a:stCxn id="3" idx="4"/>
-            <a:endCxn id="2" idx="2"/>
-          </p:cNvCxnSpPr>
+      <p:sp>
+        <p:nvSpPr>
+          <p:cNvPr id="28" name="TextBox 27">
+            <a:extLst>
+              <a:ext uri="{FF2B5EF4-FFF2-40B4-BE49-F238E27FC236}">
+                <a16:creationId xmlns:a16="http://schemas.microsoft.com/office/drawing/2014/main" id="{F188771D-A16E-4BC7-A3F1-39A2DC20921C}"/>
+              </a:ext>
+            </a:extLst>
+          </p:cNvPr>
+          <p:cNvSpPr txBox="1"/>
           <p:nvPr/>
-        </p:nvCxnSpPr>
-        <p:spPr>
-          <a:xfrm rot="16200000" flipH="1">
-            <a:off x="4175174" y="3216316"/>
-            <a:ext cx="599954" cy="1888386"/>
-          </a:xfrm>
-          <a:prstGeom prst="curvedConnector2">
-            <a:avLst/>
-          </a:prstGeom>
-          <a:ln w="38100">
-            <a:tailEnd type="triangle"/>
-          </a:ln>
-        </p:spPr>
-        <p:style>
-          <a:lnRef idx="1">
-            <a:schemeClr val="accent1"/>
-          </a:lnRef>
-          <a:fillRef idx="0">
-            <a:schemeClr val="accent1"/>
-          </a:fillRef>
-          <a:effectRef idx="0">
-            <a:schemeClr val="accent1"/>
-          </a:effectRef>
-          <a:fontRef idx="minor">
-            <a:schemeClr val="tx1"/>
-          </a:fontRef>
-        </p:style>
-      </p:cxnSp>
-      <p:cxnSp>
-        <p:nvCxnSpPr>
-          <p:cNvPr id="23" name="Connector: Curved 22">
-            <a:extLst>
-              <a:ext uri="{FF2B5EF4-FFF2-40B4-BE49-F238E27FC236}">
-                <a16:creationId xmlns:a16="http://schemas.microsoft.com/office/drawing/2014/main" id="{90ABD979-8E57-4178-B620-EF17D815C049}"/>
-              </a:ext>
-            </a:extLst>
-          </p:cNvPr>
-          <p:cNvCxnSpPr>
-            <a:cxnSpLocks/>
-            <a:stCxn id="8" idx="2"/>
-            <a:endCxn id="3" idx="0"/>
-          </p:cNvCxnSpPr>
-          <p:nvPr/>
-        </p:nvCxnSpPr>
-        <p:spPr>
-          <a:xfrm rot="10800000" flipV="1">
-            <a:off x="3530958" y="2210932"/>
-            <a:ext cx="377512" cy="918080"/>
-          </a:xfrm>
-          <a:prstGeom prst="curvedConnector2">
-            <a:avLst/>
-          </a:prstGeom>
-          <a:ln w="38100">
-            <a:tailEnd type="triangle"/>
-          </a:ln>
-        </p:spPr>
-        <p:style>
-          <a:lnRef idx="1">
-            <a:schemeClr val="accent1"/>
-          </a:lnRef>
-          <a:fillRef idx="0">
-            <a:schemeClr val="accent1"/>
-          </a:fillRef>
-          <a:effectRef idx="0">
-            <a:schemeClr val="accent1"/>
-          </a:effectRef>
-          <a:fontRef idx="minor">
-            <a:schemeClr val="tx1"/>
-          </a:fontRef>
-        </p:style>
-      </p:cxnSp>
-      <p:cxnSp>
-        <p:nvCxnSpPr>
-          <p:cNvPr id="24" name="Connector: Curved 23">
-            <a:extLst>
-              <a:ext uri="{FF2B5EF4-FFF2-40B4-BE49-F238E27FC236}">
-                <a16:creationId xmlns:a16="http://schemas.microsoft.com/office/drawing/2014/main" id="{B1537C06-439B-4019-8281-B14E43DF6F53}"/>
-              </a:ext>
-            </a:extLst>
-          </p:cNvPr>
-          <p:cNvCxnSpPr>
-            <a:cxnSpLocks/>
-            <a:stCxn id="2" idx="5"/>
-            <a:endCxn id="5" idx="3"/>
-          </p:cNvCxnSpPr>
-          <p:nvPr/>
-        </p:nvCxnSpPr>
-        <p:spPr>
-          <a:xfrm rot="16200000" flipH="1">
-            <a:off x="7129515" y="4413827"/>
-            <a:ext cx="448562" cy="1059142"/>
-          </a:xfrm>
-          <a:prstGeom prst="curvedConnector3">
-            <a:avLst>
-              <a:gd name="adj1" fmla="val 120486"/>
-            </a:avLst>
-          </a:prstGeom>
-          <a:ln w="38100">
-            <a:tailEnd type="triangle"/>
-          </a:ln>
-        </p:spPr>
-        <p:style>
-          <a:lnRef idx="1">
-            <a:schemeClr val="accent1"/>
-          </a:lnRef>
-          <a:fillRef idx="0">
-            <a:schemeClr val="accent1"/>
-          </a:fillRef>
-          <a:effectRef idx="0">
-            <a:schemeClr val="accent1"/>
-          </a:effectRef>
-          <a:fontRef idx="minor">
-            <a:schemeClr val="tx1"/>
-          </a:fontRef>
-        </p:style>
-      </p:cxnSp>
-      <p:cxnSp>
-        <p:nvCxnSpPr>
-          <p:cNvPr id="25" name="Connector: Curved 24">
-            <a:extLst>
-              <a:ext uri="{FF2B5EF4-FFF2-40B4-BE49-F238E27FC236}">
-                <a16:creationId xmlns:a16="http://schemas.microsoft.com/office/drawing/2014/main" id="{CA54429C-6FC4-4A94-8FE0-A0A5A292DC21}"/>
-              </a:ext>
-            </a:extLst>
-          </p:cNvPr>
-          <p:cNvCxnSpPr>
-            <a:cxnSpLocks/>
-            <a:stCxn id="6" idx="0"/>
-            <a:endCxn id="4" idx="6"/>
-          </p:cNvCxnSpPr>
-          <p:nvPr/>
-        </p:nvCxnSpPr>
-        <p:spPr>
-          <a:xfrm rot="16200000" flipV="1">
-            <a:off x="9462087" y="3211995"/>
-            <a:ext cx="635803" cy="565554"/>
-          </a:xfrm>
-          <a:prstGeom prst="curvedConnector2">
-            <a:avLst/>
-          </a:prstGeom>
-          <a:ln w="38100">
-            <a:tailEnd type="triangle"/>
-          </a:ln>
-        </p:spPr>
-        <p:style>
-          <a:lnRef idx="1">
-            <a:schemeClr val="accent1"/>
-          </a:lnRef>
-          <a:fillRef idx="0">
-            <a:schemeClr val="accent1"/>
-          </a:fillRef>
-          <a:effectRef idx="0">
-            <a:schemeClr val="accent1"/>
-          </a:effectRef>
-          <a:fontRef idx="minor">
-            <a:schemeClr val="tx1"/>
-          </a:fontRef>
-        </p:style>
-      </p:cxnSp>
-      <p:sp>
-        <p:nvSpPr>
-          <p:cNvPr id="75" name="Rectangle: Rounded Corners 74">
-            <a:extLst>
-              <a:ext uri="{FF2B5EF4-FFF2-40B4-BE49-F238E27FC236}">
-                <a16:creationId xmlns:a16="http://schemas.microsoft.com/office/drawing/2014/main" id="{AB4EDE0F-F597-4DD8-84B8-625A9F3FB2EA}"/>
-              </a:ext>
-            </a:extLst>
-          </p:cNvPr>
-          <p:cNvSpPr/>
-          <p:nvPr/>
         </p:nvSpPr>
         <p:spPr>
           <a:xfrm>
-            <a:off x="5205984" y="2633472"/>
-            <a:ext cx="5864352" cy="3060192"/>
-          </a:xfrm>
-          <a:prstGeom prst="roundRect">
+            <a:off x="2757180" y="1030077"/>
+            <a:ext cx="1717971" cy="369332"/>
+          </a:xfrm>
+          <a:prstGeom prst="rect">
             <a:avLst/>
           </a:prstGeom>
           <a:noFill/>
-          <a:ln w="57150">
-            <a:prstDash val="sysDot"/>
-          </a:ln>
+        </p:spPr>
+        <p:txBody>
+          <a:bodyPr wrap="none" rtlCol="0">
+            <a:spAutoFit/>
+          </a:bodyPr>
+          <a:lstStyle/>
+          <a:p>
+            <a:r>
+              <a:rPr lang="en-US" dirty="0"/>
+              <a:t>Ownership Loop</a:t>
+            </a:r>
+          </a:p>
+        </p:txBody>
+      </p:sp>
+      <p:sp>
+        <p:nvSpPr>
+          <p:cNvPr id="8" name="Multiplication Sign 7">
+            <a:extLst>
+              <a:ext uri="{FF2B5EF4-FFF2-40B4-BE49-F238E27FC236}">
+                <a16:creationId xmlns:a16="http://schemas.microsoft.com/office/drawing/2014/main" id="{28AA992C-CF03-429C-B897-38C8A0A410D2}"/>
+              </a:ext>
+            </a:extLst>
+          </p:cNvPr>
+          <p:cNvSpPr/>
+          <p:nvPr/>
+        </p:nvSpPr>
+        <p:spPr>
+          <a:xfrm>
+            <a:off x="9372247" y="2532444"/>
+            <a:ext cx="1526551" cy="1708355"/>
+          </a:xfrm>
+          <a:prstGeom prst="mathMultiply">
+            <a:avLst>
+              <a:gd name="adj1" fmla="val 8197"/>
+            </a:avLst>
+          </a:prstGeom>
+          <a:solidFill>
+            <a:srgbClr val="FF0000"/>
+          </a:solidFill>
         </p:spPr>
         <p:style>
           <a:lnRef idx="2">
@@ -4759,10 +5488,112 @@
       </p:sp>
       <p:sp>
         <p:nvSpPr>
-          <p:cNvPr id="84" name="TextBox 83">
-            <a:extLst>
-              <a:ext uri="{FF2B5EF4-FFF2-40B4-BE49-F238E27FC236}">
-                <a16:creationId xmlns:a16="http://schemas.microsoft.com/office/drawing/2014/main" id="{482861F5-73E2-477A-BFE2-C5A611DE4F90}"/>
+          <p:cNvPr id="29" name="Multiplication Sign 28">
+            <a:extLst>
+              <a:ext uri="{FF2B5EF4-FFF2-40B4-BE49-F238E27FC236}">
+                <a16:creationId xmlns:a16="http://schemas.microsoft.com/office/drawing/2014/main" id="{FC2A96D0-C3CE-46E1-8E83-158DA1B843A6}"/>
+              </a:ext>
+            </a:extLst>
+          </p:cNvPr>
+          <p:cNvSpPr/>
+          <p:nvPr/>
+        </p:nvSpPr>
+        <p:spPr>
+          <a:xfrm>
+            <a:off x="7701588" y="1786681"/>
+            <a:ext cx="1526551" cy="1708355"/>
+          </a:xfrm>
+          <a:prstGeom prst="mathMultiply">
+            <a:avLst>
+              <a:gd name="adj1" fmla="val 8197"/>
+            </a:avLst>
+          </a:prstGeom>
+          <a:solidFill>
+            <a:srgbClr val="FF0000"/>
+          </a:solidFill>
+        </p:spPr>
+        <p:style>
+          <a:lnRef idx="2">
+            <a:schemeClr val="accent1">
+              <a:shade val="50000"/>
+            </a:schemeClr>
+          </a:lnRef>
+          <a:fillRef idx="1">
+            <a:schemeClr val="accent1"/>
+          </a:fillRef>
+          <a:effectRef idx="0">
+            <a:schemeClr val="accent1"/>
+          </a:effectRef>
+          <a:fontRef idx="minor">
+            <a:schemeClr val="lt1"/>
+          </a:fontRef>
+        </p:style>
+        <p:txBody>
+          <a:bodyPr rtlCol="0" anchor="ctr"/>
+          <a:lstStyle/>
+          <a:p>
+            <a:pPr algn="ctr"/>
+            <a:endParaRPr lang="en-US"/>
+          </a:p>
+        </p:txBody>
+      </p:sp>
+      <p:sp>
+        <p:nvSpPr>
+          <p:cNvPr id="30" name="Multiplication Sign 29">
+            <a:extLst>
+              <a:ext uri="{FF2B5EF4-FFF2-40B4-BE49-F238E27FC236}">
+                <a16:creationId xmlns:a16="http://schemas.microsoft.com/office/drawing/2014/main" id="{85884AE9-289C-4309-B51A-28748A3ECC57}"/>
+              </a:ext>
+            </a:extLst>
+          </p:cNvPr>
+          <p:cNvSpPr/>
+          <p:nvPr/>
+        </p:nvSpPr>
+        <p:spPr>
+          <a:xfrm>
+            <a:off x="7706868" y="4291513"/>
+            <a:ext cx="1526551" cy="1708355"/>
+          </a:xfrm>
+          <a:prstGeom prst="mathMultiply">
+            <a:avLst>
+              <a:gd name="adj1" fmla="val 8197"/>
+            </a:avLst>
+          </a:prstGeom>
+          <a:solidFill>
+            <a:srgbClr val="FF0000"/>
+          </a:solidFill>
+        </p:spPr>
+        <p:style>
+          <a:lnRef idx="2">
+            <a:schemeClr val="accent1">
+              <a:shade val="50000"/>
+            </a:schemeClr>
+          </a:lnRef>
+          <a:fillRef idx="1">
+            <a:schemeClr val="accent1"/>
+          </a:fillRef>
+          <a:effectRef idx="0">
+            <a:schemeClr val="accent1"/>
+          </a:effectRef>
+          <a:fontRef idx="minor">
+            <a:schemeClr val="lt1"/>
+          </a:fontRef>
+        </p:style>
+        <p:txBody>
+          <a:bodyPr rtlCol="0" anchor="ctr"/>
+          <a:lstStyle/>
+          <a:p>
+            <a:pPr algn="ctr"/>
+            <a:endParaRPr lang="en-US"/>
+          </a:p>
+        </p:txBody>
+      </p:sp>
+      <p:sp>
+        <p:nvSpPr>
+          <p:cNvPr id="31" name="TextBox 30">
+            <a:extLst>
+              <a:ext uri="{FF2B5EF4-FFF2-40B4-BE49-F238E27FC236}">
+                <a16:creationId xmlns:a16="http://schemas.microsoft.com/office/drawing/2014/main" id="{BA37ED67-2098-4135-A9A9-4BE005AB882A}"/>
               </a:ext>
             </a:extLst>
           </p:cNvPr>
@@ -4771,8 +5602,8 @@
         </p:nvSpPr>
         <p:spPr>
           <a:xfrm>
-            <a:off x="2757180" y="1030077"/>
-            <a:ext cx="1717971" cy="369332"/>
+            <a:off x="7642328" y="5705613"/>
+            <a:ext cx="2037289" cy="369332"/>
           </a:xfrm>
           <a:prstGeom prst="rect">
             <a:avLst/>
@@ -4787,42 +5618,7 @@
           <a:p>
             <a:r>
               <a:rPr lang="en-US" dirty="0"/>
-              <a:t>Ownership Loop</a:t>
-            </a:r>
-          </a:p>
-        </p:txBody>
-      </p:sp>
-      <p:sp>
-        <p:nvSpPr>
-          <p:cNvPr id="85" name="TextBox 84">
-            <a:extLst>
-              <a:ext uri="{FF2B5EF4-FFF2-40B4-BE49-F238E27FC236}">
-                <a16:creationId xmlns:a16="http://schemas.microsoft.com/office/drawing/2014/main" id="{9F0113B2-CF18-4901-A202-2F7B28E71F9C}"/>
-              </a:ext>
-            </a:extLst>
-          </p:cNvPr>
-          <p:cNvSpPr txBox="1"/>
-          <p:nvPr/>
-        </p:nvSpPr>
-        <p:spPr>
-          <a:xfrm>
-            <a:off x="8978921" y="5691426"/>
-            <a:ext cx="1906804" cy="369332"/>
-          </a:xfrm>
-          <a:prstGeom prst="rect">
-            <a:avLst/>
-          </a:prstGeom>
-          <a:noFill/>
-        </p:spPr>
-        <p:txBody>
-          <a:bodyPr wrap="none" rtlCol="0">
-            <a:spAutoFit/>
-          </a:bodyPr>
-          <a:lstStyle/>
-          <a:p>
-            <a:r>
-              <a:rPr lang="en-US" dirty="0"/>
-              <a:t>What we do today</a:t>
+              <a:t>Accountability Loop</a:t>
             </a:r>
           </a:p>
         </p:txBody>
@@ -4830,13 +5626,320 @@
     </p:spTree>
     <p:extLst>
       <p:ext uri="{BB962C8B-B14F-4D97-AF65-F5344CB8AC3E}">
-        <p14:creationId xmlns:p14="http://schemas.microsoft.com/office/powerpoint/2010/main" val="1836463716"/>
+        <p14:creationId xmlns:p14="http://schemas.microsoft.com/office/powerpoint/2010/main" val="1143916537"/>
       </p:ext>
     </p:extLst>
   </p:cSld>
   <p:clrMapOvr>
     <a:masterClrMapping/>
   </p:clrMapOvr>
+  <p:timing>
+    <p:tnLst>
+      <p:par>
+        <p:cTn id="1" dur="indefinite" restart="never" nodeType="tmRoot">
+          <p:childTnLst>
+            <p:seq concurrent="1" nextAc="seek">
+              <p:cTn id="2" dur="indefinite" nodeType="mainSeq">
+                <p:childTnLst>
+                  <p:par>
+                    <p:cTn id="3" fill="hold">
+                      <p:stCondLst>
+                        <p:cond delay="indefinite"/>
+                      </p:stCondLst>
+                      <p:childTnLst>
+                        <p:par>
+                          <p:cTn id="4" fill="hold">
+                            <p:stCondLst>
+                              <p:cond delay="0"/>
+                            </p:stCondLst>
+                            <p:childTnLst>
+                              <p:par>
+                                <p:cTn id="5" presetID="1" presetClass="entr" presetSubtype="0" fill="hold" grpId="0" nodeType="clickEffect">
+                                  <p:stCondLst>
+                                    <p:cond delay="0"/>
+                                  </p:stCondLst>
+                                  <p:childTnLst>
+                                    <p:set>
+                                      <p:cBhvr>
+                                        <p:cTn id="6" dur="1" fill="hold">
+                                          <p:stCondLst>
+                                            <p:cond delay="0"/>
+                                          </p:stCondLst>
+                                        </p:cTn>
+                                        <p:tgtEl>
+                                          <p:spTgt spid="8"/>
+                                        </p:tgtEl>
+                                        <p:attrNameLst>
+                                          <p:attrName>style.visibility</p:attrName>
+                                        </p:attrNameLst>
+                                      </p:cBhvr>
+                                      <p:to>
+                                        <p:strVal val="visible"/>
+                                      </p:to>
+                                    </p:set>
+                                  </p:childTnLst>
+                                </p:cTn>
+                              </p:par>
+                              <p:par>
+                                <p:cTn id="7" presetID="1" presetClass="entr" presetSubtype="0" fill="hold" grpId="0" nodeType="withEffect">
+                                  <p:stCondLst>
+                                    <p:cond delay="0"/>
+                                  </p:stCondLst>
+                                  <p:childTnLst>
+                                    <p:set>
+                                      <p:cBhvr>
+                                        <p:cTn id="8" dur="1" fill="hold">
+                                          <p:stCondLst>
+                                            <p:cond delay="0"/>
+                                          </p:stCondLst>
+                                        </p:cTn>
+                                        <p:tgtEl>
+                                          <p:spTgt spid="16"/>
+                                        </p:tgtEl>
+                                        <p:attrNameLst>
+                                          <p:attrName>style.visibility</p:attrName>
+                                        </p:attrNameLst>
+                                      </p:cBhvr>
+                                      <p:to>
+                                        <p:strVal val="visible"/>
+                                      </p:to>
+                                    </p:set>
+                                  </p:childTnLst>
+                                </p:cTn>
+                              </p:par>
+                            </p:childTnLst>
+                          </p:cTn>
+                        </p:par>
+                      </p:childTnLst>
+                    </p:cTn>
+                  </p:par>
+                  <p:par>
+                    <p:cTn id="9" fill="hold">
+                      <p:stCondLst>
+                        <p:cond delay="indefinite"/>
+                      </p:stCondLst>
+                      <p:childTnLst>
+                        <p:par>
+                          <p:cTn id="10" fill="hold">
+                            <p:stCondLst>
+                              <p:cond delay="0"/>
+                            </p:stCondLst>
+                            <p:childTnLst>
+                              <p:par>
+                                <p:cTn id="11" presetID="1" presetClass="entr" presetSubtype="0" fill="hold" grpId="0" nodeType="clickEffect">
+                                  <p:stCondLst>
+                                    <p:cond delay="0"/>
+                                  </p:stCondLst>
+                                  <p:childTnLst>
+                                    <p:set>
+                                      <p:cBhvr>
+                                        <p:cTn id="12" dur="1" fill="hold">
+                                          <p:stCondLst>
+                                            <p:cond delay="0"/>
+                                          </p:stCondLst>
+                                        </p:cTn>
+                                        <p:tgtEl>
+                                          <p:spTgt spid="29"/>
+                                        </p:tgtEl>
+                                        <p:attrNameLst>
+                                          <p:attrName>style.visibility</p:attrName>
+                                        </p:attrNameLst>
+                                      </p:cBhvr>
+                                      <p:to>
+                                        <p:strVal val="visible"/>
+                                      </p:to>
+                                    </p:set>
+                                  </p:childTnLst>
+                                </p:cTn>
+                              </p:par>
+                              <p:par>
+                                <p:cTn id="13" presetID="1" presetClass="entr" presetSubtype="0" fill="hold" nodeType="withEffect">
+                                  <p:stCondLst>
+                                    <p:cond delay="0"/>
+                                  </p:stCondLst>
+                                  <p:childTnLst>
+                                    <p:set>
+                                      <p:cBhvr>
+                                        <p:cTn id="14" dur="1" fill="hold">
+                                          <p:stCondLst>
+                                            <p:cond delay="0"/>
+                                          </p:stCondLst>
+                                        </p:cTn>
+                                        <p:tgtEl>
+                                          <p:spTgt spid="26"/>
+                                        </p:tgtEl>
+                                        <p:attrNameLst>
+                                          <p:attrName>style.visibility</p:attrName>
+                                        </p:attrNameLst>
+                                      </p:cBhvr>
+                                      <p:to>
+                                        <p:strVal val="visible"/>
+                                      </p:to>
+                                    </p:set>
+                                  </p:childTnLst>
+                                </p:cTn>
+                              </p:par>
+                            </p:childTnLst>
+                          </p:cTn>
+                        </p:par>
+                      </p:childTnLst>
+                    </p:cTn>
+                  </p:par>
+                  <p:par>
+                    <p:cTn id="15" fill="hold">
+                      <p:stCondLst>
+                        <p:cond delay="indefinite"/>
+                      </p:stCondLst>
+                      <p:childTnLst>
+                        <p:par>
+                          <p:cTn id="16" fill="hold">
+                            <p:stCondLst>
+                              <p:cond delay="0"/>
+                            </p:stCondLst>
+                            <p:childTnLst>
+                              <p:par>
+                                <p:cTn id="17" presetID="1" presetClass="entr" presetSubtype="0" fill="hold" grpId="0" nodeType="clickEffect">
+                                  <p:stCondLst>
+                                    <p:cond delay="0"/>
+                                  </p:stCondLst>
+                                  <p:childTnLst>
+                                    <p:set>
+                                      <p:cBhvr>
+                                        <p:cTn id="18" dur="1" fill="hold">
+                                          <p:stCondLst>
+                                            <p:cond delay="0"/>
+                                          </p:stCondLst>
+                                        </p:cTn>
+                                        <p:tgtEl>
+                                          <p:spTgt spid="30"/>
+                                        </p:tgtEl>
+                                        <p:attrNameLst>
+                                          <p:attrName>style.visibility</p:attrName>
+                                        </p:attrNameLst>
+                                      </p:cBhvr>
+                                      <p:to>
+                                        <p:strVal val="visible"/>
+                                      </p:to>
+                                    </p:set>
+                                  </p:childTnLst>
+                                </p:cTn>
+                              </p:par>
+                              <p:par>
+                                <p:cTn id="19" presetID="1" presetClass="entr" presetSubtype="0" fill="hold" nodeType="withEffect">
+                                  <p:stCondLst>
+                                    <p:cond delay="0"/>
+                                  </p:stCondLst>
+                                  <p:childTnLst>
+                                    <p:set>
+                                      <p:cBhvr>
+                                        <p:cTn id="20" dur="1" fill="hold">
+                                          <p:stCondLst>
+                                            <p:cond delay="0"/>
+                                          </p:stCondLst>
+                                        </p:cTn>
+                                        <p:tgtEl>
+                                          <p:spTgt spid="23"/>
+                                        </p:tgtEl>
+                                        <p:attrNameLst>
+                                          <p:attrName>style.visibility</p:attrName>
+                                        </p:attrNameLst>
+                                      </p:cBhvr>
+                                      <p:to>
+                                        <p:strVal val="visible"/>
+                                      </p:to>
+                                    </p:set>
+                                  </p:childTnLst>
+                                </p:cTn>
+                              </p:par>
+                              <p:par>
+                                <p:cTn id="21" presetID="1" presetClass="entr" presetSubtype="0" fill="hold" grpId="0" nodeType="withEffect">
+                                  <p:stCondLst>
+                                    <p:cond delay="0"/>
+                                  </p:stCondLst>
+                                  <p:childTnLst>
+                                    <p:set>
+                                      <p:cBhvr>
+                                        <p:cTn id="22" dur="1" fill="hold">
+                                          <p:stCondLst>
+                                            <p:cond delay="0"/>
+                                          </p:stCondLst>
+                                        </p:cTn>
+                                        <p:tgtEl>
+                                          <p:spTgt spid="17"/>
+                                        </p:tgtEl>
+                                        <p:attrNameLst>
+                                          <p:attrName>style.visibility</p:attrName>
+                                        </p:attrNameLst>
+                                      </p:cBhvr>
+                                      <p:to>
+                                        <p:strVal val="visible"/>
+                                      </p:to>
+                                    </p:set>
+                                  </p:childTnLst>
+                                </p:cTn>
+                              </p:par>
+                              <p:par>
+                                <p:cTn id="23" presetID="1" presetClass="entr" presetSubtype="0" fill="hold" nodeType="withEffect">
+                                  <p:stCondLst>
+                                    <p:cond delay="0"/>
+                                  </p:stCondLst>
+                                  <p:childTnLst>
+                                    <p:set>
+                                      <p:cBhvr>
+                                        <p:cTn id="24" dur="1" fill="hold">
+                                          <p:stCondLst>
+                                            <p:cond delay="0"/>
+                                          </p:stCondLst>
+                                        </p:cTn>
+                                        <p:tgtEl>
+                                          <p:spTgt spid="27"/>
+                                        </p:tgtEl>
+                                        <p:attrNameLst>
+                                          <p:attrName>style.visibility</p:attrName>
+                                        </p:attrNameLst>
+                                      </p:cBhvr>
+                                      <p:to>
+                                        <p:strVal val="visible"/>
+                                      </p:to>
+                                    </p:set>
+                                  </p:childTnLst>
+                                </p:cTn>
+                              </p:par>
+                            </p:childTnLst>
+                          </p:cTn>
+                        </p:par>
+                      </p:childTnLst>
+                    </p:cTn>
+                  </p:par>
+                </p:childTnLst>
+              </p:cTn>
+              <p:prevCondLst>
+                <p:cond evt="onPrev" delay="0">
+                  <p:tgtEl>
+                    <p:sldTgt/>
+                  </p:tgtEl>
+                </p:cond>
+              </p:prevCondLst>
+              <p:nextCondLst>
+                <p:cond evt="onNext" delay="0">
+                  <p:tgtEl>
+                    <p:sldTgt/>
+                  </p:tgtEl>
+                </p:cond>
+              </p:nextCondLst>
+            </p:seq>
+          </p:childTnLst>
+        </p:cTn>
+      </p:par>
+    </p:tnLst>
+    <p:bldLst>
+      <p:bldP spid="16" grpId="0" animBg="1"/>
+      <p:bldP spid="17" grpId="0" animBg="1"/>
+      <p:bldP spid="8" grpId="0" animBg="1"/>
+      <p:bldP spid="29" grpId="0" animBg="1"/>
+      <p:bldP spid="30" grpId="0" animBg="1"/>
+    </p:bldLst>
+  </p:timing>
 </p:sld>
 </file>
 
@@ -4912,17 +6015,58 @@
                   <a:schemeClr val="tx1"/>
                 </a:solidFill>
               </a:rPr>
-              <a:t>Execution</a:t>
-            </a:r>
-          </a:p>
-        </p:txBody>
-      </p:sp>
-      <p:sp>
-        <p:nvSpPr>
-          <p:cNvPr id="3" name="Oval 2">
-            <a:extLst>
-              <a:ext uri="{FF2B5EF4-FFF2-40B4-BE49-F238E27FC236}">
-                <a16:creationId xmlns:a16="http://schemas.microsoft.com/office/drawing/2014/main" id="{4CAA13D0-0843-4970-A947-8933171577A2}"/>
+              <a:t>Execute</a:t>
+            </a:r>
+          </a:p>
+        </p:txBody>
+      </p:sp>
+      <p:sp>
+        <p:nvSpPr>
+          <p:cNvPr id="10" name="TextBox 9">
+            <a:extLst>
+              <a:ext uri="{FF2B5EF4-FFF2-40B4-BE49-F238E27FC236}">
+                <a16:creationId xmlns:a16="http://schemas.microsoft.com/office/drawing/2014/main" id="{174A2CEC-EB6A-41A1-B458-E3858BC6759F}"/>
+              </a:ext>
+            </a:extLst>
+          </p:cNvPr>
+          <p:cNvSpPr txBox="1"/>
+          <p:nvPr/>
+        </p:nvSpPr>
+        <p:spPr>
+          <a:xfrm>
+            <a:off x="5443566" y="3755295"/>
+            <a:ext cx="686726" cy="369332"/>
+          </a:xfrm>
+          <a:prstGeom prst="rect">
+            <a:avLst/>
+          </a:prstGeom>
+          <a:noFill/>
+        </p:spPr>
+        <p:txBody>
+          <a:bodyPr wrap="none" rtlCol="0">
+            <a:spAutoFit/>
+          </a:bodyPr>
+          <a:lstStyle/>
+          <a:p>
+            <a:r>
+              <a:rPr lang="en-US" dirty="0">
+                <a:solidFill>
+                  <a:schemeClr val="accent1">
+                    <a:lumMod val="75000"/>
+                  </a:schemeClr>
+                </a:solidFill>
+              </a:rPr>
+              <a:t>Team</a:t>
+            </a:r>
+          </a:p>
+        </p:txBody>
+      </p:sp>
+      <p:sp>
+        <p:nvSpPr>
+          <p:cNvPr id="16" name="Oval 15">
+            <a:extLst>
+              <a:ext uri="{FF2B5EF4-FFF2-40B4-BE49-F238E27FC236}">
+                <a16:creationId xmlns:a16="http://schemas.microsoft.com/office/drawing/2014/main" id="{F5467CAE-C6F5-4457-A3F0-44045D635ACB}"/>
               </a:ext>
             </a:extLst>
           </p:cNvPr>
@@ -4972,187 +6116,17 @@
                   <a:schemeClr val="tx1"/>
                 </a:solidFill>
               </a:rPr>
-              <a:t>Decision</a:t>
-            </a:r>
-          </a:p>
-        </p:txBody>
-      </p:sp>
-      <p:sp>
-        <p:nvSpPr>
-          <p:cNvPr id="4" name="Oval 3">
-            <a:extLst>
-              <a:ext uri="{FF2B5EF4-FFF2-40B4-BE49-F238E27FC236}">
-                <a16:creationId xmlns:a16="http://schemas.microsoft.com/office/drawing/2014/main" id="{054D106C-15BF-448E-9A60-38A5345EAD19}"/>
-              </a:ext>
-            </a:extLst>
-          </p:cNvPr>
-          <p:cNvSpPr/>
-          <p:nvPr/>
-        </p:nvSpPr>
-        <p:spPr>
-          <a:xfrm>
-            <a:off x="7442859" y="2811110"/>
-            <a:ext cx="2054352" cy="731520"/>
-          </a:xfrm>
-          <a:prstGeom prst="ellipse">
-            <a:avLst/>
-          </a:prstGeom>
-          <a:noFill/>
-          <a:ln w="28575"/>
-        </p:spPr>
-        <p:style>
-          <a:lnRef idx="2">
-            <a:schemeClr val="accent1">
-              <a:shade val="50000"/>
-            </a:schemeClr>
-          </a:lnRef>
-          <a:fillRef idx="1">
-            <a:schemeClr val="accent1"/>
-          </a:fillRef>
-          <a:effectRef idx="0">
-            <a:schemeClr val="accent1"/>
-          </a:effectRef>
-          <a:fontRef idx="minor">
-            <a:schemeClr val="lt1"/>
-          </a:fontRef>
-        </p:style>
-        <p:txBody>
-          <a:bodyPr rtlCol="0" anchor="ctr"/>
-          <a:lstStyle/>
-          <a:p>
-            <a:pPr algn="ctr"/>
-            <a:r>
-              <a:rPr lang="en-US" dirty="0">
-                <a:solidFill>
-                  <a:schemeClr val="tx1"/>
-                </a:solidFill>
-              </a:rPr>
-              <a:t>Commitment</a:t>
-            </a:r>
-          </a:p>
-        </p:txBody>
-      </p:sp>
-      <p:sp>
-        <p:nvSpPr>
-          <p:cNvPr id="5" name="Oval 4">
-            <a:extLst>
-              <a:ext uri="{FF2B5EF4-FFF2-40B4-BE49-F238E27FC236}">
-                <a16:creationId xmlns:a16="http://schemas.microsoft.com/office/drawing/2014/main" id="{B63B4930-7C2A-46CB-B169-397B0F16E318}"/>
-              </a:ext>
-            </a:extLst>
-          </p:cNvPr>
-          <p:cNvSpPr/>
-          <p:nvPr/>
-        </p:nvSpPr>
-        <p:spPr>
-          <a:xfrm>
-            <a:off x="7642328" y="4543288"/>
-            <a:ext cx="1645920" cy="731520"/>
-          </a:xfrm>
-          <a:prstGeom prst="ellipse">
-            <a:avLst/>
-          </a:prstGeom>
-          <a:noFill/>
-          <a:ln w="28575"/>
-        </p:spPr>
-        <p:style>
-          <a:lnRef idx="2">
-            <a:schemeClr val="accent1">
-              <a:shade val="50000"/>
-            </a:schemeClr>
-          </a:lnRef>
-          <a:fillRef idx="1">
-            <a:schemeClr val="accent1"/>
-          </a:fillRef>
-          <a:effectRef idx="0">
-            <a:schemeClr val="accent1"/>
-          </a:effectRef>
-          <a:fontRef idx="minor">
-            <a:schemeClr val="lt1"/>
-          </a:fontRef>
-        </p:style>
-        <p:txBody>
-          <a:bodyPr rtlCol="0" anchor="ctr"/>
-          <a:lstStyle/>
-          <a:p>
-            <a:pPr algn="ctr"/>
-            <a:r>
-              <a:rPr lang="en-US" dirty="0">
-                <a:solidFill>
-                  <a:schemeClr val="tx1"/>
-                </a:solidFill>
-              </a:rPr>
-              <a:t>Assess</a:t>
-            </a:r>
-          </a:p>
-        </p:txBody>
-      </p:sp>
-      <p:sp>
-        <p:nvSpPr>
-          <p:cNvPr id="6" name="Oval 5">
-            <a:extLst>
-              <a:ext uri="{FF2B5EF4-FFF2-40B4-BE49-F238E27FC236}">
-                <a16:creationId xmlns:a16="http://schemas.microsoft.com/office/drawing/2014/main" id="{04F590A8-7F59-4211-B3CE-7A74FEB3714E}"/>
-              </a:ext>
-            </a:extLst>
-          </p:cNvPr>
-          <p:cNvSpPr/>
-          <p:nvPr/>
-        </p:nvSpPr>
-        <p:spPr>
-          <a:xfrm>
-            <a:off x="9239805" y="3812673"/>
-            <a:ext cx="1645920" cy="731520"/>
-          </a:xfrm>
-          <a:prstGeom prst="ellipse">
-            <a:avLst/>
-          </a:prstGeom>
-          <a:solidFill>
-            <a:schemeClr val="accent2">
-              <a:lumMod val="40000"/>
-              <a:lumOff val="60000"/>
-            </a:schemeClr>
-          </a:solidFill>
-          <a:ln w="28575"/>
-        </p:spPr>
-        <p:style>
-          <a:lnRef idx="2">
-            <a:schemeClr val="accent1">
-              <a:shade val="50000"/>
-            </a:schemeClr>
-          </a:lnRef>
-          <a:fillRef idx="1">
-            <a:schemeClr val="accent1"/>
-          </a:fillRef>
-          <a:effectRef idx="0">
-            <a:schemeClr val="accent1"/>
-          </a:effectRef>
-          <a:fontRef idx="minor">
-            <a:schemeClr val="lt1"/>
-          </a:fontRef>
-        </p:style>
-        <p:txBody>
-          <a:bodyPr rtlCol="0" anchor="ctr"/>
-          <a:lstStyle/>
-          <a:p>
-            <a:pPr algn="ctr"/>
-            <a:r>
-              <a:rPr lang="en-US" dirty="0">
-                <a:solidFill>
-                  <a:schemeClr val="tx1"/>
-                </a:solidFill>
-              </a:rPr>
-              <a:t>Feedback</a:t>
-            </a:r>
-          </a:p>
-        </p:txBody>
-      </p:sp>
-      <p:sp>
-        <p:nvSpPr>
-          <p:cNvPr id="8" name="Oval 7">
-            <a:extLst>
-              <a:ext uri="{FF2B5EF4-FFF2-40B4-BE49-F238E27FC236}">
-                <a16:creationId xmlns:a16="http://schemas.microsoft.com/office/drawing/2014/main" id="{A6EDD052-18D7-4A33-BCB1-7602A2A3536F}"/>
+              <a:t>Direction</a:t>
+            </a:r>
+          </a:p>
+        </p:txBody>
+      </p:sp>
+      <p:sp>
+        <p:nvSpPr>
+          <p:cNvPr id="17" name="Oval 16">
+            <a:extLst>
+              <a:ext uri="{FF2B5EF4-FFF2-40B4-BE49-F238E27FC236}">
+                <a16:creationId xmlns:a16="http://schemas.microsoft.com/office/drawing/2014/main" id="{1A03C2EE-4E91-4E16-BC96-047376D7C7D7}"/>
               </a:ext>
             </a:extLst>
           </p:cNvPr>
@@ -5209,90 +6183,10 @@
       </p:sp>
       <p:sp>
         <p:nvSpPr>
-          <p:cNvPr id="9" name="TextBox 8">
-            <a:extLst>
-              <a:ext uri="{FF2B5EF4-FFF2-40B4-BE49-F238E27FC236}">
-                <a16:creationId xmlns:a16="http://schemas.microsoft.com/office/drawing/2014/main" id="{3A496956-7CE1-4753-8FCA-247F6A957F97}"/>
-              </a:ext>
-            </a:extLst>
-          </p:cNvPr>
-          <p:cNvSpPr txBox="1"/>
-          <p:nvPr/>
-        </p:nvSpPr>
-        <p:spPr>
-          <a:xfrm>
-            <a:off x="9219020" y="3445579"/>
-            <a:ext cx="825867" cy="369332"/>
-          </a:xfrm>
-          <a:prstGeom prst="rect">
-            <a:avLst/>
-          </a:prstGeom>
-          <a:noFill/>
-        </p:spPr>
-        <p:txBody>
-          <a:bodyPr wrap="none" rtlCol="0">
-            <a:spAutoFit/>
-          </a:bodyPr>
-          <a:lstStyle/>
-          <a:p>
-            <a:r>
-              <a:rPr lang="en-US" dirty="0">
-                <a:solidFill>
-                  <a:srgbClr val="F09456"/>
-                </a:solidFill>
-              </a:rPr>
-              <a:t>Leader</a:t>
-            </a:r>
-          </a:p>
-        </p:txBody>
-      </p:sp>
-      <p:sp>
-        <p:nvSpPr>
-          <p:cNvPr id="10" name="TextBox 9">
-            <a:extLst>
-              <a:ext uri="{FF2B5EF4-FFF2-40B4-BE49-F238E27FC236}">
-                <a16:creationId xmlns:a16="http://schemas.microsoft.com/office/drawing/2014/main" id="{174A2CEC-EB6A-41A1-B458-E3858BC6759F}"/>
-              </a:ext>
-            </a:extLst>
-          </p:cNvPr>
-          <p:cNvSpPr txBox="1"/>
-          <p:nvPr/>
-        </p:nvSpPr>
-        <p:spPr>
-          <a:xfrm>
-            <a:off x="5443566" y="3755295"/>
-            <a:ext cx="686726" cy="369332"/>
-          </a:xfrm>
-          <a:prstGeom prst="rect">
-            <a:avLst/>
-          </a:prstGeom>
-          <a:noFill/>
-        </p:spPr>
-        <p:txBody>
-          <a:bodyPr wrap="none" rtlCol="0">
-            <a:spAutoFit/>
-          </a:bodyPr>
-          <a:lstStyle/>
-          <a:p>
-            <a:r>
-              <a:rPr lang="en-US" dirty="0">
-                <a:solidFill>
-                  <a:schemeClr val="accent1">
-                    <a:lumMod val="75000"/>
-                  </a:schemeClr>
-                </a:solidFill>
-              </a:rPr>
-              <a:t>Team</a:t>
-            </a:r>
-          </a:p>
-        </p:txBody>
-      </p:sp>
-      <p:sp>
-        <p:nvSpPr>
-          <p:cNvPr id="11" name="Rectangle: Rounded Corners 10">
-            <a:extLst>
-              <a:ext uri="{FF2B5EF4-FFF2-40B4-BE49-F238E27FC236}">
-                <a16:creationId xmlns:a16="http://schemas.microsoft.com/office/drawing/2014/main" id="{1592A05E-A27F-406A-B192-0BCE3574B3C6}"/>
+          <p:cNvPr id="18" name="Rectangle: Rounded Corners 17">
+            <a:extLst>
+              <a:ext uri="{FF2B5EF4-FFF2-40B4-BE49-F238E27FC236}">
+                <a16:creationId xmlns:a16="http://schemas.microsoft.com/office/drawing/2014/main" id="{70B13BEE-852E-4C1E-A7DC-593751946B9E}"/>
               </a:ext>
             </a:extLst>
           </p:cNvPr>
@@ -5339,23 +6233,24 @@
       </p:sp>
       <p:cxnSp>
         <p:nvCxnSpPr>
-          <p:cNvPr id="19" name="Connector: Curved 18">
-            <a:extLst>
-              <a:ext uri="{FF2B5EF4-FFF2-40B4-BE49-F238E27FC236}">
-                <a16:creationId xmlns:a16="http://schemas.microsoft.com/office/drawing/2014/main" id="{CE3921C5-1C91-4967-85A7-C67AB731B4AA}"/>
+          <p:cNvPr id="23" name="Connector: Curved 22">
+            <a:extLst>
+              <a:ext uri="{FF2B5EF4-FFF2-40B4-BE49-F238E27FC236}">
+                <a16:creationId xmlns:a16="http://schemas.microsoft.com/office/drawing/2014/main" id="{94F89EF5-34A3-40FC-B3B1-9CFBBD3299A1}"/>
               </a:ext>
             </a:extLst>
           </p:cNvPr>
           <p:cNvCxnSpPr>
-            <a:stCxn id="5" idx="6"/>
-            <a:endCxn id="6" idx="4"/>
+            <a:cxnSpLocks/>
+            <a:stCxn id="2" idx="0"/>
+            <a:endCxn id="17" idx="6"/>
           </p:cNvCxnSpPr>
           <p:nvPr/>
         </p:nvCxnSpPr>
         <p:spPr>
-          <a:xfrm flipV="1">
-            <a:off x="9288248" y="4544193"/>
-            <a:ext cx="774517" cy="364855"/>
+          <a:xfrm rot="16200000" flipV="1">
+            <a:off x="4956450" y="2808872"/>
+            <a:ext cx="1883794" cy="687914"/>
           </a:xfrm>
           <a:prstGeom prst="curvedConnector2">
             <a:avLst/>
@@ -5381,24 +6276,24 @@
       </p:cxnSp>
       <p:cxnSp>
         <p:nvCxnSpPr>
-          <p:cNvPr id="20" name="Connector: Curved 19">
-            <a:extLst>
-              <a:ext uri="{FF2B5EF4-FFF2-40B4-BE49-F238E27FC236}">
-                <a16:creationId xmlns:a16="http://schemas.microsoft.com/office/drawing/2014/main" id="{C609C0A7-2BD3-437B-A7F4-49CA496BFDCD}"/>
+          <p:cNvPr id="26" name="Connector: Curved 25">
+            <a:extLst>
+              <a:ext uri="{FF2B5EF4-FFF2-40B4-BE49-F238E27FC236}">
+                <a16:creationId xmlns:a16="http://schemas.microsoft.com/office/drawing/2014/main" id="{77123615-CD96-4D7D-B5A7-C53BC52B6ACA}"/>
               </a:ext>
             </a:extLst>
           </p:cNvPr>
           <p:cNvCxnSpPr>
             <a:cxnSpLocks/>
-            <a:stCxn id="4" idx="2"/>
-            <a:endCxn id="2" idx="7"/>
+            <a:stCxn id="16" idx="4"/>
+            <a:endCxn id="2" idx="2"/>
           </p:cNvCxnSpPr>
           <p:nvPr/>
         </p:nvCxnSpPr>
         <p:spPr>
-          <a:xfrm rot="10800000" flipV="1">
-            <a:off x="6824225" y="3176869"/>
-            <a:ext cx="618634" cy="1024985"/>
+          <a:xfrm rot="16200000" flipH="1">
+            <a:off x="4175174" y="3216316"/>
+            <a:ext cx="599954" cy="1888386"/>
           </a:xfrm>
           <a:prstGeom prst="curvedConnector2">
             <a:avLst/>
@@ -5424,24 +6319,24 @@
       </p:cxnSp>
       <p:cxnSp>
         <p:nvCxnSpPr>
-          <p:cNvPr id="21" name="Connector: Curved 20">
-            <a:extLst>
-              <a:ext uri="{FF2B5EF4-FFF2-40B4-BE49-F238E27FC236}">
-                <a16:creationId xmlns:a16="http://schemas.microsoft.com/office/drawing/2014/main" id="{2A226C98-BC87-485C-92A2-B40A1CF0D019}"/>
+          <p:cNvPr id="27" name="Connector: Curved 26">
+            <a:extLst>
+              <a:ext uri="{FF2B5EF4-FFF2-40B4-BE49-F238E27FC236}">
+                <a16:creationId xmlns:a16="http://schemas.microsoft.com/office/drawing/2014/main" id="{0CFBBDE4-12D9-42F2-94D7-AC8BE054F727}"/>
               </a:ext>
             </a:extLst>
           </p:cNvPr>
           <p:cNvCxnSpPr>
             <a:cxnSpLocks/>
-            <a:stCxn id="2" idx="0"/>
-            <a:endCxn id="8" idx="6"/>
+            <a:stCxn id="17" idx="2"/>
+            <a:endCxn id="16" idx="0"/>
           </p:cNvCxnSpPr>
           <p:nvPr/>
         </p:nvCxnSpPr>
         <p:spPr>
-          <a:xfrm rot="16200000" flipV="1">
-            <a:off x="4956450" y="2808872"/>
-            <a:ext cx="1883794" cy="687914"/>
+          <a:xfrm rot="10800000" flipV="1">
+            <a:off x="3530958" y="2210932"/>
+            <a:ext cx="377512" cy="918080"/>
           </a:xfrm>
           <a:prstGeom prst="curvedConnector2">
             <a:avLst/>
@@ -5465,32 +6360,65 @@
           </a:fontRef>
         </p:style>
       </p:cxnSp>
-      <p:cxnSp>
-        <p:nvCxnSpPr>
-          <p:cNvPr id="22" name="Connector: Curved 21">
-            <a:extLst>
-              <a:ext uri="{FF2B5EF4-FFF2-40B4-BE49-F238E27FC236}">
-                <a16:creationId xmlns:a16="http://schemas.microsoft.com/office/drawing/2014/main" id="{0F934F1D-FBD7-47E4-9158-E11160668588}"/>
-              </a:ext>
-            </a:extLst>
-          </p:cNvPr>
-          <p:cNvCxnSpPr>
-            <a:cxnSpLocks/>
-            <a:stCxn id="3" idx="4"/>
-            <a:endCxn id="2" idx="2"/>
-          </p:cNvCxnSpPr>
+      <p:sp>
+        <p:nvSpPr>
+          <p:cNvPr id="28" name="TextBox 27">
+            <a:extLst>
+              <a:ext uri="{FF2B5EF4-FFF2-40B4-BE49-F238E27FC236}">
+                <a16:creationId xmlns:a16="http://schemas.microsoft.com/office/drawing/2014/main" id="{F188771D-A16E-4BC7-A3F1-39A2DC20921C}"/>
+              </a:ext>
+            </a:extLst>
+          </p:cNvPr>
+          <p:cNvSpPr txBox="1"/>
           <p:nvPr/>
-        </p:nvCxnSpPr>
-        <p:spPr>
-          <a:xfrm rot="16200000" flipH="1">
-            <a:off x="4175174" y="3216316"/>
-            <a:ext cx="599954" cy="1888386"/>
-          </a:xfrm>
-          <a:prstGeom prst="curvedConnector2">
+        </p:nvSpPr>
+        <p:spPr>
+          <a:xfrm>
+            <a:off x="2757180" y="1030077"/>
+            <a:ext cx="1717971" cy="369332"/>
+          </a:xfrm>
+          <a:prstGeom prst="rect">
             <a:avLst/>
           </a:prstGeom>
-          <a:ln w="38100">
-            <a:tailEnd type="triangle"/>
+          <a:noFill/>
+        </p:spPr>
+        <p:txBody>
+          <a:bodyPr wrap="none" rtlCol="0">
+            <a:spAutoFit/>
+          </a:bodyPr>
+          <a:lstStyle/>
+          <a:p>
+            <a:r>
+              <a:rPr lang="en-US" dirty="0"/>
+              <a:t>Ownership Loop</a:t>
+            </a:r>
+          </a:p>
+        </p:txBody>
+      </p:sp>
+      <p:sp>
+        <p:nvSpPr>
+          <p:cNvPr id="31" name="Left Brace 30">
+            <a:extLst>
+              <a:ext uri="{FF2B5EF4-FFF2-40B4-BE49-F238E27FC236}">
+                <a16:creationId xmlns:a16="http://schemas.microsoft.com/office/drawing/2014/main" id="{B020C7AC-1AFB-4D5F-B9CF-D98D749EF8AF}"/>
+              </a:ext>
+            </a:extLst>
+          </p:cNvPr>
+          <p:cNvSpPr/>
+          <p:nvPr/>
+        </p:nvSpPr>
+        <p:spPr>
+          <a:xfrm flipH="1">
+            <a:off x="7294022" y="1149830"/>
+            <a:ext cx="1255776" cy="4267258"/>
+          </a:xfrm>
+          <a:prstGeom prst="leftBrace">
+            <a:avLst/>
+          </a:prstGeom>
+          <a:ln w="57150">
+            <a:solidFill>
+              <a:schemeClr val="accent2"/>
+            </a:solidFill>
           </a:ln>
         </p:spPr>
         <p:style>
@@ -5507,179 +6435,6 @@
             <a:schemeClr val="tx1"/>
           </a:fontRef>
         </p:style>
-      </p:cxnSp>
-      <p:cxnSp>
-        <p:nvCxnSpPr>
-          <p:cNvPr id="23" name="Connector: Curved 22">
-            <a:extLst>
-              <a:ext uri="{FF2B5EF4-FFF2-40B4-BE49-F238E27FC236}">
-                <a16:creationId xmlns:a16="http://schemas.microsoft.com/office/drawing/2014/main" id="{90ABD979-8E57-4178-B620-EF17D815C049}"/>
-              </a:ext>
-            </a:extLst>
-          </p:cNvPr>
-          <p:cNvCxnSpPr>
-            <a:cxnSpLocks/>
-            <a:stCxn id="8" idx="2"/>
-            <a:endCxn id="3" idx="0"/>
-          </p:cNvCxnSpPr>
-          <p:nvPr/>
-        </p:nvCxnSpPr>
-        <p:spPr>
-          <a:xfrm rot="10800000" flipV="1">
-            <a:off x="3530958" y="2210932"/>
-            <a:ext cx="377512" cy="918080"/>
-          </a:xfrm>
-          <a:prstGeom prst="curvedConnector2">
-            <a:avLst/>
-          </a:prstGeom>
-          <a:ln w="38100">
-            <a:tailEnd type="triangle"/>
-          </a:ln>
-        </p:spPr>
-        <p:style>
-          <a:lnRef idx="1">
-            <a:schemeClr val="accent1"/>
-          </a:lnRef>
-          <a:fillRef idx="0">
-            <a:schemeClr val="accent1"/>
-          </a:fillRef>
-          <a:effectRef idx="0">
-            <a:schemeClr val="accent1"/>
-          </a:effectRef>
-          <a:fontRef idx="minor">
-            <a:schemeClr val="tx1"/>
-          </a:fontRef>
-        </p:style>
-      </p:cxnSp>
-      <p:cxnSp>
-        <p:nvCxnSpPr>
-          <p:cNvPr id="24" name="Connector: Curved 23">
-            <a:extLst>
-              <a:ext uri="{FF2B5EF4-FFF2-40B4-BE49-F238E27FC236}">
-                <a16:creationId xmlns:a16="http://schemas.microsoft.com/office/drawing/2014/main" id="{B1537C06-439B-4019-8281-B14E43DF6F53}"/>
-              </a:ext>
-            </a:extLst>
-          </p:cNvPr>
-          <p:cNvCxnSpPr>
-            <a:cxnSpLocks/>
-            <a:stCxn id="2" idx="5"/>
-            <a:endCxn id="5" idx="3"/>
-          </p:cNvCxnSpPr>
-          <p:nvPr/>
-        </p:nvCxnSpPr>
-        <p:spPr>
-          <a:xfrm rot="16200000" flipH="1">
-            <a:off x="7129515" y="4413827"/>
-            <a:ext cx="448562" cy="1059142"/>
-          </a:xfrm>
-          <a:prstGeom prst="curvedConnector3">
-            <a:avLst>
-              <a:gd name="adj1" fmla="val 120486"/>
-            </a:avLst>
-          </a:prstGeom>
-          <a:ln w="38100">
-            <a:tailEnd type="triangle"/>
-          </a:ln>
-        </p:spPr>
-        <p:style>
-          <a:lnRef idx="1">
-            <a:schemeClr val="accent1"/>
-          </a:lnRef>
-          <a:fillRef idx="0">
-            <a:schemeClr val="accent1"/>
-          </a:fillRef>
-          <a:effectRef idx="0">
-            <a:schemeClr val="accent1"/>
-          </a:effectRef>
-          <a:fontRef idx="minor">
-            <a:schemeClr val="tx1"/>
-          </a:fontRef>
-        </p:style>
-      </p:cxnSp>
-      <p:cxnSp>
-        <p:nvCxnSpPr>
-          <p:cNvPr id="25" name="Connector: Curved 24">
-            <a:extLst>
-              <a:ext uri="{FF2B5EF4-FFF2-40B4-BE49-F238E27FC236}">
-                <a16:creationId xmlns:a16="http://schemas.microsoft.com/office/drawing/2014/main" id="{CA54429C-6FC4-4A94-8FE0-A0A5A292DC21}"/>
-              </a:ext>
-            </a:extLst>
-          </p:cNvPr>
-          <p:cNvCxnSpPr>
-            <a:cxnSpLocks/>
-            <a:stCxn id="6" idx="0"/>
-            <a:endCxn id="4" idx="6"/>
-          </p:cNvCxnSpPr>
-          <p:nvPr/>
-        </p:nvCxnSpPr>
-        <p:spPr>
-          <a:xfrm rot="16200000" flipV="1">
-            <a:off x="9462087" y="3211995"/>
-            <a:ext cx="635803" cy="565554"/>
-          </a:xfrm>
-          <a:prstGeom prst="curvedConnector2">
-            <a:avLst/>
-          </a:prstGeom>
-          <a:ln w="38100">
-            <a:tailEnd type="triangle"/>
-          </a:ln>
-        </p:spPr>
-        <p:style>
-          <a:lnRef idx="1">
-            <a:schemeClr val="accent1"/>
-          </a:lnRef>
-          <a:fillRef idx="0">
-            <a:schemeClr val="accent1"/>
-          </a:fillRef>
-          <a:effectRef idx="0">
-            <a:schemeClr val="accent1"/>
-          </a:effectRef>
-          <a:fontRef idx="minor">
-            <a:schemeClr val="tx1"/>
-          </a:fontRef>
-        </p:style>
-      </p:cxnSp>
-      <p:sp>
-        <p:nvSpPr>
-          <p:cNvPr id="75" name="Rectangle: Rounded Corners 74">
-            <a:extLst>
-              <a:ext uri="{FF2B5EF4-FFF2-40B4-BE49-F238E27FC236}">
-                <a16:creationId xmlns:a16="http://schemas.microsoft.com/office/drawing/2014/main" id="{AB4EDE0F-F597-4DD8-84B8-625A9F3FB2EA}"/>
-              </a:ext>
-            </a:extLst>
-          </p:cNvPr>
-          <p:cNvSpPr/>
-          <p:nvPr/>
-        </p:nvSpPr>
-        <p:spPr>
-          <a:xfrm>
-            <a:off x="5205984" y="2633472"/>
-            <a:ext cx="5864352" cy="3060192"/>
-          </a:xfrm>
-          <a:prstGeom prst="roundRect">
-            <a:avLst/>
-          </a:prstGeom>
-          <a:noFill/>
-          <a:ln w="57150">
-            <a:prstDash val="sysDot"/>
-          </a:ln>
-        </p:spPr>
-        <p:style>
-          <a:lnRef idx="2">
-            <a:schemeClr val="accent1">
-              <a:shade val="50000"/>
-            </a:schemeClr>
-          </a:lnRef>
-          <a:fillRef idx="1">
-            <a:schemeClr val="accent1"/>
-          </a:fillRef>
-          <a:effectRef idx="0">
-            <a:schemeClr val="accent1"/>
-          </a:effectRef>
-          <a:fontRef idx="minor">
-            <a:schemeClr val="lt1"/>
-          </a:fontRef>
-        </p:style>
         <p:txBody>
           <a:bodyPr rtlCol="0" anchor="ctr"/>
           <a:lstStyle/>
@@ -5691,10 +6446,10 @@
       </p:sp>
       <p:sp>
         <p:nvSpPr>
-          <p:cNvPr id="84" name="TextBox 83">
-            <a:extLst>
-              <a:ext uri="{FF2B5EF4-FFF2-40B4-BE49-F238E27FC236}">
-                <a16:creationId xmlns:a16="http://schemas.microsoft.com/office/drawing/2014/main" id="{482861F5-73E2-477A-BFE2-C5A611DE4F90}"/>
+          <p:cNvPr id="32" name="TextBox 31">
+            <a:extLst>
+              <a:ext uri="{FF2B5EF4-FFF2-40B4-BE49-F238E27FC236}">
+                <a16:creationId xmlns:a16="http://schemas.microsoft.com/office/drawing/2014/main" id="{4299AF5E-2E2C-4709-A55D-B168B3059B61}"/>
               </a:ext>
             </a:extLst>
           </p:cNvPr>
@@ -5702,127 +6457,8 @@
           <p:nvPr/>
         </p:nvSpPr>
         <p:spPr>
-          <a:xfrm>
-            <a:off x="2757180" y="1030077"/>
-            <a:ext cx="1717971" cy="369332"/>
-          </a:xfrm>
-          <a:prstGeom prst="rect">
-            <a:avLst/>
-          </a:prstGeom>
-          <a:noFill/>
-        </p:spPr>
-        <p:txBody>
-          <a:bodyPr wrap="none" rtlCol="0">
-            <a:spAutoFit/>
-          </a:bodyPr>
-          <a:lstStyle/>
-          <a:p>
-            <a:r>
-              <a:rPr lang="en-US" dirty="0"/>
-              <a:t>Ownership Loop</a:t>
-            </a:r>
-          </a:p>
-        </p:txBody>
-      </p:sp>
-      <p:sp>
-        <p:nvSpPr>
-          <p:cNvPr id="85" name="TextBox 84">
-            <a:extLst>
-              <a:ext uri="{FF2B5EF4-FFF2-40B4-BE49-F238E27FC236}">
-                <a16:creationId xmlns:a16="http://schemas.microsoft.com/office/drawing/2014/main" id="{9F0113B2-CF18-4901-A202-2F7B28E71F9C}"/>
-              </a:ext>
-            </a:extLst>
-          </p:cNvPr>
-          <p:cNvSpPr txBox="1"/>
-          <p:nvPr/>
-        </p:nvSpPr>
-        <p:spPr>
-          <a:xfrm>
-            <a:off x="8978921" y="5691426"/>
-            <a:ext cx="1906804" cy="369332"/>
-          </a:xfrm>
-          <a:prstGeom prst="rect">
-            <a:avLst/>
-          </a:prstGeom>
-          <a:noFill/>
-        </p:spPr>
-        <p:txBody>
-          <a:bodyPr wrap="none" rtlCol="0">
-            <a:spAutoFit/>
-          </a:bodyPr>
-          <a:lstStyle/>
-          <a:p>
-            <a:r>
-              <a:rPr lang="en-US" dirty="0"/>
-              <a:t>What we do today</a:t>
-            </a:r>
-          </a:p>
-        </p:txBody>
-      </p:sp>
-      <p:sp>
-        <p:nvSpPr>
-          <p:cNvPr id="7" name="Left Brace 6">
-            <a:extLst>
-              <a:ext uri="{FF2B5EF4-FFF2-40B4-BE49-F238E27FC236}">
-                <a16:creationId xmlns:a16="http://schemas.microsoft.com/office/drawing/2014/main" id="{B38068E4-15BC-45B8-9855-9C2036EC97AA}"/>
-              </a:ext>
-            </a:extLst>
-          </p:cNvPr>
-          <p:cNvSpPr/>
-          <p:nvPr/>
-        </p:nvSpPr>
-        <p:spPr>
-          <a:xfrm>
-            <a:off x="1485234" y="1007550"/>
-            <a:ext cx="1255776" cy="4267258"/>
-          </a:xfrm>
-          <a:prstGeom prst="leftBrace">
-            <a:avLst/>
-          </a:prstGeom>
-          <a:ln w="57150">
-            <a:solidFill>
-              <a:schemeClr val="tx1"/>
-            </a:solidFill>
-          </a:ln>
-        </p:spPr>
-        <p:style>
-          <a:lnRef idx="1">
-            <a:schemeClr val="accent1"/>
-          </a:lnRef>
-          <a:fillRef idx="0">
-            <a:schemeClr val="accent1"/>
-          </a:fillRef>
-          <a:effectRef idx="0">
-            <a:schemeClr val="accent1"/>
-          </a:effectRef>
-          <a:fontRef idx="minor">
-            <a:schemeClr val="tx1"/>
-          </a:fontRef>
-        </p:style>
-        <p:txBody>
-          <a:bodyPr rtlCol="0" anchor="ctr"/>
-          <a:lstStyle/>
-          <a:p>
-            <a:pPr algn="ctr"/>
-            <a:endParaRPr lang="en-US"/>
-          </a:p>
-        </p:txBody>
-      </p:sp>
-      <p:sp>
-        <p:nvSpPr>
-          <p:cNvPr id="26" name="TextBox 25">
-            <a:extLst>
-              <a:ext uri="{FF2B5EF4-FFF2-40B4-BE49-F238E27FC236}">
-                <a16:creationId xmlns:a16="http://schemas.microsoft.com/office/drawing/2014/main" id="{D5F936EC-6E62-44A7-AE48-5A9EF4D6B04E}"/>
-              </a:ext>
-            </a:extLst>
-          </p:cNvPr>
-          <p:cNvSpPr txBox="1"/>
-          <p:nvPr/>
-        </p:nvSpPr>
-        <p:spPr>
-          <a:xfrm>
-            <a:off x="485164" y="2783496"/>
+          <a:xfrm flipH="1">
+            <a:off x="8461321" y="2300640"/>
             <a:ext cx="825867" cy="369332"/>
           </a:xfrm>
           <a:prstGeom prst="rect">
@@ -5849,10 +6485,10 @@
       </p:sp>
       <p:sp>
         <p:nvSpPr>
-          <p:cNvPr id="34" name="TextBox 33">
-            <a:extLst>
-              <a:ext uri="{FF2B5EF4-FFF2-40B4-BE49-F238E27FC236}">
-                <a16:creationId xmlns:a16="http://schemas.microsoft.com/office/drawing/2014/main" id="{408FD75E-6921-4E75-9E1C-509F39594702}"/>
+          <p:cNvPr id="33" name="TextBox 32">
+            <a:extLst>
+              <a:ext uri="{FF2B5EF4-FFF2-40B4-BE49-F238E27FC236}">
+                <a16:creationId xmlns:a16="http://schemas.microsoft.com/office/drawing/2014/main" id="{5A1E13BC-3FBB-4305-BC25-67B915B70E55}"/>
               </a:ext>
             </a:extLst>
           </p:cNvPr>
@@ -5860,8 +6496,8 @@
           <p:nvPr/>
         </p:nvSpPr>
         <p:spPr>
-          <a:xfrm>
-            <a:off x="712917" y="3227829"/>
+          <a:xfrm flipH="1">
+            <a:off x="8857487" y="2960293"/>
             <a:ext cx="893643" cy="646331"/>
           </a:xfrm>
           <a:prstGeom prst="rect">
@@ -5876,113 +6512,30 @@
           <a:lstStyle/>
           <a:p>
             <a:r>
-              <a:rPr lang="en-US" dirty="0"/>
+              <a:rPr lang="en-US" dirty="0">
+                <a:solidFill>
+                  <a:schemeClr val="accent2"/>
+                </a:solidFill>
+              </a:rPr>
               <a:t>Mentor</a:t>
             </a:r>
           </a:p>
           <a:p>
             <a:r>
-              <a:rPr lang="en-US" dirty="0"/>
+              <a:rPr lang="en-US" dirty="0">
+                <a:solidFill>
+                  <a:schemeClr val="accent2"/>
+                </a:solidFill>
+              </a:rPr>
               <a:t>Coach</a:t>
             </a:r>
-          </a:p>
-        </p:txBody>
-      </p:sp>
-      <p:sp>
-        <p:nvSpPr>
-          <p:cNvPr id="36" name="TextBox 35">
-            <a:extLst>
-              <a:ext uri="{FF2B5EF4-FFF2-40B4-BE49-F238E27FC236}">
-                <a16:creationId xmlns:a16="http://schemas.microsoft.com/office/drawing/2014/main" id="{D6DE6639-C9D8-4437-B783-3EBCC09E736D}"/>
-              </a:ext>
-            </a:extLst>
-          </p:cNvPr>
-          <p:cNvSpPr txBox="1"/>
-          <p:nvPr/>
-        </p:nvSpPr>
-        <p:spPr>
-          <a:xfrm>
-            <a:off x="9857549" y="3074010"/>
-            <a:ext cx="1197636" cy="369332"/>
-          </a:xfrm>
-          <a:prstGeom prst="rect">
-            <a:avLst/>
-          </a:prstGeom>
-          <a:noFill/>
-        </p:spPr>
-        <p:txBody>
-          <a:bodyPr wrap="none" rtlCol="0">
-            <a:spAutoFit/>
-          </a:bodyPr>
-          <a:lstStyle/>
-          <a:p>
-            <a:r>
-              <a:rPr lang="en-US" strike="sngStrike" dirty="0"/>
-              <a:t>Consultant</a:t>
-            </a:r>
-          </a:p>
-        </p:txBody>
-      </p:sp>
-      <p:sp>
-        <p:nvSpPr>
-          <p:cNvPr id="14" name="Multiplication Sign 13">
-            <a:extLst>
-              <a:ext uri="{FF2B5EF4-FFF2-40B4-BE49-F238E27FC236}">
-                <a16:creationId xmlns:a16="http://schemas.microsoft.com/office/drawing/2014/main" id="{14943EB6-F03B-4C9F-8F2E-D0D231FBA7DE}"/>
-              </a:ext>
-            </a:extLst>
-          </p:cNvPr>
-          <p:cNvSpPr/>
-          <p:nvPr/>
-        </p:nvSpPr>
-        <p:spPr>
-          <a:xfrm rot="20977522">
-            <a:off x="7258975" y="845339"/>
-            <a:ext cx="4347665" cy="6558575"/>
-          </a:xfrm>
-          <a:prstGeom prst="mathMultiply">
-            <a:avLst>
-              <a:gd name="adj1" fmla="val 1406"/>
-            </a:avLst>
-          </a:prstGeom>
-          <a:solidFill>
-            <a:schemeClr val="tx1"/>
-          </a:solidFill>
-          <a:ln>
-            <a:solidFill>
-              <a:schemeClr val="tx1"/>
-            </a:solidFill>
-          </a:ln>
-        </p:spPr>
-        <p:style>
-          <a:lnRef idx="2">
-            <a:schemeClr val="accent1">
-              <a:shade val="50000"/>
-            </a:schemeClr>
-          </a:lnRef>
-          <a:fillRef idx="1">
-            <a:schemeClr val="accent1"/>
-          </a:fillRef>
-          <a:effectRef idx="0">
-            <a:schemeClr val="accent1"/>
-          </a:effectRef>
-          <a:fontRef idx="minor">
-            <a:schemeClr val="lt1"/>
-          </a:fontRef>
-        </p:style>
-        <p:txBody>
-          <a:bodyPr rtlCol="0" anchor="ctr"/>
-          <a:lstStyle/>
-          <a:p>
-            <a:pPr algn="ctr"/>
-            <a:endParaRPr lang="en-US"/>
           </a:p>
         </p:txBody>
       </p:sp>
     </p:spTree>
     <p:extLst>
       <p:ext uri="{BB962C8B-B14F-4D97-AF65-F5344CB8AC3E}">
-        <p14:creationId xmlns:p14="http://schemas.microsoft.com/office/powerpoint/2010/main" val="3664926765"/>
+        <p14:creationId xmlns:p14="http://schemas.microsoft.com/office/powerpoint/2010/main" val="1504865557"/>
       </p:ext>
     </p:extLst>
   </p:cSld>
@@ -6288,6 +6841,21 @@
 </file>
 
 <file path=customXml/item1.xml><?xml version="1.0" encoding="utf-8"?>
+<p:properties xmlns:p="http://schemas.microsoft.com/office/2006/metadata/properties" xmlns:xsi="http://www.w3.org/2001/XMLSchema-instance" xmlns:pc="http://schemas.microsoft.com/office/infopath/2007/PartnerControls">
+  <documentManagement/>
+</p:properties>
+</file>
+
+<file path=customXml/item2.xml><?xml version="1.0" encoding="utf-8"?>
+<?mso-contentType ?>
+<FormTemplates xmlns="http://schemas.microsoft.com/sharepoint/v3/contenttype/forms">
+  <Display>DocumentLibraryForm</Display>
+  <Edit>DocumentLibraryForm</Edit>
+  <New>DocumentLibraryForm</New>
+</FormTemplates>
+</file>
+
+<file path=customXml/item3.xml><?xml version="1.0" encoding="utf-8"?>
 <ct:contentTypeSchema xmlns:ct="http://schemas.microsoft.com/office/2006/metadata/contentType" xmlns:ma="http://schemas.microsoft.com/office/2006/metadata/properties/metaAttributes" ct:_="" ma:_="" ma:contentTypeName="Document" ma:contentTypeID="0x0101008777661E06988045B99CD3FA919F022E" ma:contentTypeVersion="8" ma:contentTypeDescription="Create a new document." ma:contentTypeScope="" ma:versionID="f1135cba6aa083cf3362dafe11332254">
   <xsd:schema xmlns:xsd="http://www.w3.org/2001/XMLSchema" xmlns:xs="http://www.w3.org/2001/XMLSchema" xmlns:p="http://schemas.microsoft.com/office/2006/metadata/properties" xmlns:ns2="9aa76b75-b306-42d6-a9ed-ce126284139a" xmlns:ns3="42b40662-1e4d-4c4b-b699-8711daf7d8b7" targetNamespace="http://schemas.microsoft.com/office/2006/metadata/properties" ma:root="true" ma:fieldsID="9fd06e95077c18db512cd43667d7ec99" ns2:_="" ns3:_="">
     <xsd:import namespace="9aa76b75-b306-42d6-a9ed-ce126284139a"/>
@@ -6478,22 +7046,32 @@
 </ct:contentTypeSchema>
 </file>
 
-<file path=customXml/item2.xml><?xml version="1.0" encoding="utf-8"?>
-<?mso-contentType ?>
-<FormTemplates xmlns="http://schemas.microsoft.com/sharepoint/v3/contenttype/forms">
-  <Display>DocumentLibraryForm</Display>
-  <Edit>DocumentLibraryForm</Edit>
-  <New>DocumentLibraryForm</New>
-</FormTemplates>
+<file path=customXml/itemProps1.xml><?xml version="1.0" encoding="utf-8"?>
+<ds:datastoreItem xmlns:ds="http://schemas.openxmlformats.org/officeDocument/2006/customXml" ds:itemID="{2ABAD810-E40D-4A52-9F8D-C593D05D3678}">
+  <ds:schemaRefs>
+    <ds:schemaRef ds:uri="http://purl.org/dc/elements/1.1/"/>
+    <ds:schemaRef ds:uri="http://purl.org/dc/dcmitype/"/>
+    <ds:schemaRef ds:uri="http://purl.org/dc/terms/"/>
+    <ds:schemaRef ds:uri="42b40662-1e4d-4c4b-b699-8711daf7d8b7"/>
+    <ds:schemaRef ds:uri="http://schemas.microsoft.com/office/2006/documentManagement/types"/>
+    <ds:schemaRef ds:uri="http://schemas.microsoft.com/office/infopath/2007/PartnerControls"/>
+    <ds:schemaRef ds:uri="9aa76b75-b306-42d6-a9ed-ce126284139a"/>
+    <ds:schemaRef ds:uri="http://schemas.openxmlformats.org/package/2006/metadata/core-properties"/>
+    <ds:schemaRef ds:uri="http://schemas.microsoft.com/office/2006/metadata/properties"/>
+    <ds:schemaRef ds:uri="http://www.w3.org/XML/1998/namespace"/>
+  </ds:schemaRefs>
+</ds:datastoreItem>
 </file>
 
-<file path=customXml/item3.xml><?xml version="1.0" encoding="utf-8"?>
-<p:properties xmlns:p="http://schemas.microsoft.com/office/2006/metadata/properties" xmlns:xsi="http://www.w3.org/2001/XMLSchema-instance" xmlns:pc="http://schemas.microsoft.com/office/infopath/2007/PartnerControls">
-  <documentManagement/>
-</p:properties>
+<file path=customXml/itemProps2.xml><?xml version="1.0" encoding="utf-8"?>
+<ds:datastoreItem xmlns:ds="http://schemas.openxmlformats.org/officeDocument/2006/customXml" ds:itemID="{737D61EC-37EC-448B-AE2E-4E9D7D78D075}">
+  <ds:schemaRefs>
+    <ds:schemaRef ds:uri="http://schemas.microsoft.com/sharepoint/v3/contenttype/forms"/>
+  </ds:schemaRefs>
+</ds:datastoreItem>
 </file>
 
-<file path=customXml/itemProps1.xml><?xml version="1.0" encoding="utf-8"?>
+<file path=customXml/itemProps3.xml><?xml version="1.0" encoding="utf-8"?>
 <ds:datastoreItem xmlns:ds="http://schemas.openxmlformats.org/officeDocument/2006/customXml" ds:itemID="{2C7D50A2-49BB-41E3-881B-53DECCFC4E0A}">
   <ds:schemaRefs>
     <ds:schemaRef ds:uri="http://schemas.microsoft.com/office/2006/metadata/contentType"/>
@@ -6510,29 +7088,4 @@
     <ds:schemaRef ds:uri="http://schemas.microsoft.com/internal/obd"/>
   </ds:schemaRefs>
 </ds:datastoreItem>
-</file>
-
-<file path=customXml/itemProps2.xml><?xml version="1.0" encoding="utf-8"?>
-<ds:datastoreItem xmlns:ds="http://schemas.openxmlformats.org/officeDocument/2006/customXml" ds:itemID="{737D61EC-37EC-448B-AE2E-4E9D7D78D075}">
-  <ds:schemaRefs>
-    <ds:schemaRef ds:uri="http://schemas.microsoft.com/sharepoint/v3/contenttype/forms"/>
-  </ds:schemaRefs>
-</ds:datastoreItem>
-</file>
-
-<file path=customXml/itemProps3.xml><?xml version="1.0" encoding="utf-8"?>
-<ds:datastoreItem xmlns:ds="http://schemas.openxmlformats.org/officeDocument/2006/customXml" ds:itemID="{2ABAD810-E40D-4A52-9F8D-C593D05D3678}">
-  <ds:schemaRefs>
-    <ds:schemaRef ds:uri="http://purl.org/dc/elements/1.1/"/>
-    <ds:schemaRef ds:uri="http://purl.org/dc/dcmitype/"/>
-    <ds:schemaRef ds:uri="http://purl.org/dc/terms/"/>
-    <ds:schemaRef ds:uri="42b40662-1e4d-4c4b-b699-8711daf7d8b7"/>
-    <ds:schemaRef ds:uri="http://schemas.microsoft.com/office/2006/documentManagement/types"/>
-    <ds:schemaRef ds:uri="http://schemas.microsoft.com/office/infopath/2007/PartnerControls"/>
-    <ds:schemaRef ds:uri="9aa76b75-b306-42d6-a9ed-ce126284139a"/>
-    <ds:schemaRef ds:uri="http://schemas.openxmlformats.org/package/2006/metadata/core-properties"/>
-    <ds:schemaRef ds:uri="http://schemas.microsoft.com/office/2006/metadata/properties"/>
-    <ds:schemaRef ds:uri="http://www.w3.org/XML/1998/namespace"/>
-  </ds:schemaRefs>
-</ds:datastoreItem>
 </file>
</xml_diff>